<commit_message>
desktop learning model result update
</commit_message>
<xml_diff>
--- a/final_project/최종 발표/캡스톤 기말 프로젝트 21-6조.pptx
+++ b/final_project/최종 발표/캡스톤 기말 프로젝트 21-6조.pptx
@@ -5,24 +5,26 @@
     <p:sldMasterId id="2147483648" r:id="rId4"/>
   </p:sldMasterIdLst>
   <p:notesMasterIdLst>
-    <p:notesMasterId r:id="rId17"/>
+    <p:notesMasterId r:id="rId19"/>
   </p:notesMasterIdLst>
   <p:handoutMasterIdLst>
-    <p:handoutMasterId r:id="rId18"/>
+    <p:handoutMasterId r:id="rId20"/>
   </p:handoutMasterIdLst>
   <p:sldIdLst>
     <p:sldId id="256" r:id="rId5"/>
     <p:sldId id="331" r:id="rId6"/>
     <p:sldId id="348" r:id="rId7"/>
-    <p:sldId id="343" r:id="rId8"/>
+    <p:sldId id="352" r:id="rId8"/>
     <p:sldId id="350" r:id="rId9"/>
-    <p:sldId id="328" r:id="rId10"/>
-    <p:sldId id="335" r:id="rId11"/>
-    <p:sldId id="351" r:id="rId12"/>
-    <p:sldId id="336" r:id="rId13"/>
-    <p:sldId id="349" r:id="rId14"/>
-    <p:sldId id="347" r:id="rId15"/>
-    <p:sldId id="268" r:id="rId16"/>
+    <p:sldId id="343" r:id="rId10"/>
+    <p:sldId id="328" r:id="rId11"/>
+    <p:sldId id="353" r:id="rId12"/>
+    <p:sldId id="335" r:id="rId13"/>
+    <p:sldId id="351" r:id="rId14"/>
+    <p:sldId id="336" r:id="rId15"/>
+    <p:sldId id="349" r:id="rId16"/>
+    <p:sldId id="347" r:id="rId17"/>
+    <p:sldId id="268" r:id="rId18"/>
   </p:sldIdLst>
   <p:sldSz cx="9144000" cy="6858000" type="screen4x3"/>
   <p:notesSz cx="6797675" cy="9926638"/>
@@ -837,6 +839,174 @@
 </p:notes>
 </file>
 
+<file path=ppt/notesSlides/notesSlide11.xml><?xml version="1.0" encoding="utf-8"?>
+<p:notes xmlns:a="http://schemas.openxmlformats.org/drawingml/2006/main" xmlns:r="http://schemas.openxmlformats.org/officeDocument/2006/relationships" xmlns:p="http://schemas.openxmlformats.org/presentationml/2006/main">
+  <p:cSld>
+    <p:spTree>
+      <p:nvGrpSpPr>
+        <p:cNvPr id="1" name=""/>
+        <p:cNvGrpSpPr/>
+        <p:nvPr/>
+      </p:nvGrpSpPr>
+      <p:grpSpPr>
+        <a:xfrm>
+          <a:off x="0" y="0"/>
+          <a:ext cx="0" cy="0"/>
+          <a:chOff x="0" y="0"/>
+          <a:chExt cx="0" cy="0"/>
+        </a:xfrm>
+      </p:grpSpPr>
+      <p:sp>
+        <p:nvSpPr>
+          <p:cNvPr id="2" name="슬라이드 이미지 개체 틀 1"/>
+          <p:cNvSpPr>
+            <a:spLocks noGrp="1" noRot="1" noChangeAspect="1"/>
+          </p:cNvSpPr>
+          <p:nvPr>
+            <p:ph type="sldImg"/>
+          </p:nvPr>
+        </p:nvSpPr>
+        <p:spPr/>
+      </p:sp>
+      <p:sp>
+        <p:nvSpPr>
+          <p:cNvPr id="3" name="슬라이드 노트 개체 틀 2"/>
+          <p:cNvSpPr>
+            <a:spLocks noGrp="1"/>
+          </p:cNvSpPr>
+          <p:nvPr>
+            <p:ph type="body" idx="1"/>
+          </p:nvPr>
+        </p:nvSpPr>
+        <p:spPr/>
+        <p:txBody>
+          <a:bodyPr/>
+          <a:lstStyle/>
+          <a:p>
+            <a:endParaRPr lang="ko-KR" altLang="en-US" dirty="0"/>
+          </a:p>
+        </p:txBody>
+      </p:sp>
+      <p:sp>
+        <p:nvSpPr>
+          <p:cNvPr id="4" name="슬라이드 번호 개체 틀 3"/>
+          <p:cNvSpPr>
+            <a:spLocks noGrp="1"/>
+          </p:cNvSpPr>
+          <p:nvPr>
+            <p:ph type="sldNum" sz="quarter" idx="5"/>
+          </p:nvPr>
+        </p:nvSpPr>
+        <p:spPr/>
+        <p:txBody>
+          <a:bodyPr/>
+          <a:lstStyle/>
+          <a:p>
+            <a:fld id="{7D996AB9-55DC-445E-98F1-083156B566BE}" type="slidenum">
+              <a:rPr lang="ko-KR" altLang="en-US" smtClean="0"/>
+              <a:t>12</a:t>
+            </a:fld>
+            <a:endParaRPr lang="ko-KR" altLang="en-US"/>
+          </a:p>
+        </p:txBody>
+      </p:sp>
+    </p:spTree>
+    <p:extLst>
+      <p:ext uri="{BB962C8B-B14F-4D97-AF65-F5344CB8AC3E}">
+        <p14:creationId xmlns:p14="http://schemas.microsoft.com/office/powerpoint/2010/main" val="2674857218"/>
+      </p:ext>
+    </p:extLst>
+  </p:cSld>
+  <p:clrMapOvr>
+    <a:masterClrMapping/>
+  </p:clrMapOvr>
+</p:notes>
+</file>
+
+<file path=ppt/notesSlides/notesSlide12.xml><?xml version="1.0" encoding="utf-8"?>
+<p:notes xmlns:a="http://schemas.openxmlformats.org/drawingml/2006/main" xmlns:r="http://schemas.openxmlformats.org/officeDocument/2006/relationships" xmlns:p="http://schemas.openxmlformats.org/presentationml/2006/main">
+  <p:cSld>
+    <p:spTree>
+      <p:nvGrpSpPr>
+        <p:cNvPr id="1" name=""/>
+        <p:cNvGrpSpPr/>
+        <p:nvPr/>
+      </p:nvGrpSpPr>
+      <p:grpSpPr>
+        <a:xfrm>
+          <a:off x="0" y="0"/>
+          <a:ext cx="0" cy="0"/>
+          <a:chOff x="0" y="0"/>
+          <a:chExt cx="0" cy="0"/>
+        </a:xfrm>
+      </p:grpSpPr>
+      <p:sp>
+        <p:nvSpPr>
+          <p:cNvPr id="2" name="슬라이드 이미지 개체 틀 1"/>
+          <p:cNvSpPr>
+            <a:spLocks noGrp="1" noRot="1" noChangeAspect="1"/>
+          </p:cNvSpPr>
+          <p:nvPr>
+            <p:ph type="sldImg"/>
+          </p:nvPr>
+        </p:nvSpPr>
+        <p:spPr/>
+      </p:sp>
+      <p:sp>
+        <p:nvSpPr>
+          <p:cNvPr id="3" name="슬라이드 노트 개체 틀 2"/>
+          <p:cNvSpPr>
+            <a:spLocks noGrp="1"/>
+          </p:cNvSpPr>
+          <p:nvPr>
+            <p:ph type="body" idx="1"/>
+          </p:nvPr>
+        </p:nvSpPr>
+        <p:spPr/>
+        <p:txBody>
+          <a:bodyPr/>
+          <a:lstStyle/>
+          <a:p>
+            <a:endParaRPr lang="ko-KR" altLang="en-US" dirty="0"/>
+          </a:p>
+        </p:txBody>
+      </p:sp>
+      <p:sp>
+        <p:nvSpPr>
+          <p:cNvPr id="4" name="슬라이드 번호 개체 틀 3"/>
+          <p:cNvSpPr>
+            <a:spLocks noGrp="1"/>
+          </p:cNvSpPr>
+          <p:nvPr>
+            <p:ph type="sldNum" sz="quarter" idx="5"/>
+          </p:nvPr>
+        </p:nvSpPr>
+        <p:spPr/>
+        <p:txBody>
+          <a:bodyPr/>
+          <a:lstStyle/>
+          <a:p>
+            <a:fld id="{7D996AB9-55DC-445E-98F1-083156B566BE}" type="slidenum">
+              <a:rPr lang="ko-KR" altLang="en-US" smtClean="0"/>
+              <a:t>13</a:t>
+            </a:fld>
+            <a:endParaRPr lang="ko-KR" altLang="en-US"/>
+          </a:p>
+        </p:txBody>
+      </p:sp>
+    </p:spTree>
+    <p:extLst>
+      <p:ext uri="{BB962C8B-B14F-4D97-AF65-F5344CB8AC3E}">
+        <p14:creationId xmlns:p14="http://schemas.microsoft.com/office/powerpoint/2010/main" val="1350739499"/>
+      </p:ext>
+    </p:extLst>
+  </p:cSld>
+  <p:clrMapOvr>
+    <a:masterClrMapping/>
+  </p:clrMapOvr>
+</p:notes>
+</file>
+
 <file path=ppt/notesSlides/notesSlide2.xml><?xml version="1.0" encoding="utf-8"?>
 <p:notes xmlns:a="http://schemas.openxmlformats.org/drawingml/2006/main" xmlns:r="http://schemas.openxmlformats.org/officeDocument/2006/relationships" xmlns:p="http://schemas.openxmlformats.org/presentationml/2006/main">
   <p:cSld>
@@ -995,7 +1165,7 @@
     </p:spTree>
     <p:extLst>
       <p:ext uri="{BB962C8B-B14F-4D97-AF65-F5344CB8AC3E}">
-        <p14:creationId xmlns:p14="http://schemas.microsoft.com/office/powerpoint/2010/main" val="1806458896"/>
+        <p14:creationId xmlns:p14="http://schemas.microsoft.com/office/powerpoint/2010/main" val="402414079"/>
       </p:ext>
     </p:extLst>
   </p:cSld>
@@ -1163,7 +1333,7 @@
     </p:spTree>
     <p:extLst>
       <p:ext uri="{BB962C8B-B14F-4D97-AF65-F5344CB8AC3E}">
-        <p14:creationId xmlns:p14="http://schemas.microsoft.com/office/powerpoint/2010/main" val="1769757"/>
+        <p14:creationId xmlns:p14="http://schemas.microsoft.com/office/powerpoint/2010/main" val="1806458896"/>
       </p:ext>
     </p:extLst>
   </p:cSld>
@@ -1247,7 +1417,7 @@
     </p:spTree>
     <p:extLst>
       <p:ext uri="{BB962C8B-B14F-4D97-AF65-F5344CB8AC3E}">
-        <p14:creationId xmlns:p14="http://schemas.microsoft.com/office/powerpoint/2010/main" val="1183021469"/>
+        <p14:creationId xmlns:p14="http://schemas.microsoft.com/office/powerpoint/2010/main" val="1769757"/>
       </p:ext>
     </p:extLst>
   </p:cSld>
@@ -1331,7 +1501,7 @@
     </p:spTree>
     <p:extLst>
       <p:ext uri="{BB962C8B-B14F-4D97-AF65-F5344CB8AC3E}">
-        <p14:creationId xmlns:p14="http://schemas.microsoft.com/office/powerpoint/2010/main" val="2093478385"/>
+        <p14:creationId xmlns:p14="http://schemas.microsoft.com/office/powerpoint/2010/main" val="3727550046"/>
       </p:ext>
     </p:extLst>
   </p:cSld>
@@ -1415,7 +1585,7 @@
     </p:spTree>
     <p:extLst>
       <p:ext uri="{BB962C8B-B14F-4D97-AF65-F5344CB8AC3E}">
-        <p14:creationId xmlns:p14="http://schemas.microsoft.com/office/powerpoint/2010/main" val="1350739499"/>
+        <p14:creationId xmlns:p14="http://schemas.microsoft.com/office/powerpoint/2010/main" val="1183021469"/>
       </p:ext>
     </p:extLst>
   </p:cSld>
@@ -1499,7 +1669,7 @@
     </p:spTree>
     <p:extLst>
       <p:ext uri="{BB962C8B-B14F-4D97-AF65-F5344CB8AC3E}">
-        <p14:creationId xmlns:p14="http://schemas.microsoft.com/office/powerpoint/2010/main" val="2674857218"/>
+        <p14:creationId xmlns:p14="http://schemas.microsoft.com/office/powerpoint/2010/main" val="2093478385"/>
       </p:ext>
     </p:extLst>
   </p:cSld>
@@ -5328,7 +5498,7 @@
         </p:nvSpPr>
         <p:spPr>
           <a:xfrm>
-            <a:off x="299927" y="105444"/>
+            <a:off x="176544" y="85377"/>
             <a:ext cx="8196507" cy="584775"/>
           </a:xfrm>
           <a:prstGeom prst="rect">
@@ -5350,7 +5520,7 @@
                 <a:latin typeface="HY견고딕" panose="02030600000101010101" pitchFamily="18" charset="-127"/>
                 <a:ea typeface="HY견고딕" panose="02030600000101010101" pitchFamily="18" charset="-127"/>
               </a:rPr>
-              <a:t>결과 및 토의</a:t>
+              <a:t>모델 학습 </a:t>
             </a:r>
             <a:endParaRPr lang="ko-KR" altLang="en-US" sz="3200" dirty="0">
               <a:solidFill>
@@ -5377,7 +5547,7 @@
         <p:spPr>
           <a:xfrm>
             <a:off x="155912" y="944638"/>
-            <a:ext cx="8706254" cy="3012812"/>
+            <a:ext cx="8706254" cy="948145"/>
           </a:xfrm>
           <a:prstGeom prst="rect">
             <a:avLst/>
@@ -5399,83 +5569,7 @@
               <a:rPr lang="ko-KR" altLang="en-US" sz="2000" b="1">
                 <a:latin typeface="+mn-ea"/>
               </a:rPr>
-              <a:t>테스트 결과</a:t>
-            </a:r>
-            <a:endParaRPr lang="en-US" altLang="ko-KR" sz="2000" b="1">
-              <a:latin typeface="+mn-ea"/>
-            </a:endParaRPr>
-          </a:p>
-          <a:p>
-            <a:pPr>
-              <a:lnSpc>
-                <a:spcPts val="2300"/>
-              </a:lnSpc>
-            </a:pPr>
-            <a:endParaRPr lang="en-US" altLang="ko-KR" sz="2000" b="1">
-              <a:latin typeface="+mn-ea"/>
-            </a:endParaRPr>
-          </a:p>
-          <a:p>
-            <a:pPr>
-              <a:lnSpc>
-                <a:spcPts val="2300"/>
-              </a:lnSpc>
-            </a:pPr>
-            <a:endParaRPr lang="en-US" altLang="ko-KR" sz="2000" b="1">
-              <a:latin typeface="+mn-ea"/>
-            </a:endParaRPr>
-          </a:p>
-          <a:p>
-            <a:pPr>
-              <a:lnSpc>
-                <a:spcPts val="2300"/>
-              </a:lnSpc>
-            </a:pPr>
-            <a:endParaRPr lang="en-US" altLang="ko-KR" sz="2000" b="1">
-              <a:latin typeface="+mn-ea"/>
-            </a:endParaRPr>
-          </a:p>
-          <a:p>
-            <a:pPr>
-              <a:lnSpc>
-                <a:spcPts val="2300"/>
-              </a:lnSpc>
-            </a:pPr>
-            <a:endParaRPr lang="en-US" altLang="ko-KR" sz="2000" b="1">
-              <a:latin typeface="+mn-ea"/>
-            </a:endParaRPr>
-          </a:p>
-          <a:p>
-            <a:pPr>
-              <a:lnSpc>
-                <a:spcPts val="2300"/>
-              </a:lnSpc>
-            </a:pPr>
-            <a:endParaRPr lang="en-US" altLang="ko-KR" sz="1600">
-              <a:latin typeface="+mn-ea"/>
-            </a:endParaRPr>
-          </a:p>
-          <a:p>
-            <a:pPr>
-              <a:lnSpc>
-                <a:spcPts val="2300"/>
-              </a:lnSpc>
-            </a:pPr>
-            <a:endParaRPr lang="en-US" altLang="ko-KR" sz="1600">
-              <a:latin typeface="+mn-ea"/>
-            </a:endParaRPr>
-          </a:p>
-          <a:p>
-            <a:pPr>
-              <a:lnSpc>
-                <a:spcPts val="2300"/>
-              </a:lnSpc>
-            </a:pPr>
-            <a:r>
-              <a:rPr lang="ko-KR" altLang="en-US" sz="2000" b="1">
-                <a:latin typeface="+mn-ea"/>
-              </a:rPr>
-              <a:t>오분류 사례 및 개선점</a:t>
+              <a:t>학습 출력 결과</a:t>
             </a:r>
             <a:endParaRPr lang="en-US" altLang="ko-KR" sz="2000" b="1">
               <a:latin typeface="+mn-ea"/>
@@ -5493,11 +5587,26 @@
               <a:rPr lang="ko-KR" altLang="en-US" sz="1600">
                 <a:latin typeface="+mn-ea"/>
               </a:rPr>
-              <a:t>제공 받은 테스트 데이터셋에서 발생한 오분류 사례 분석</a:t>
-            </a:r>
-            <a:endParaRPr lang="en-US" altLang="ko-KR" sz="1600">
-              <a:latin typeface="+mn-ea"/>
-            </a:endParaRPr>
+              <a:t>재현율</a:t>
+            </a:r>
+            <a:r>
+              <a:rPr lang="en-US" altLang="ko-KR" sz="1600">
+                <a:latin typeface="+mn-ea"/>
+              </a:rPr>
+              <a:t>, </a:t>
+            </a:r>
+            <a:r>
+              <a:rPr lang="ko-KR" altLang="en-US" sz="1600">
+                <a:latin typeface="+mn-ea"/>
+              </a:rPr>
+              <a:t>정밀도</a:t>
+            </a:r>
+            <a:r>
+              <a:rPr lang="en-US" altLang="ko-KR" sz="1600">
+                <a:latin typeface="+mn-ea"/>
+              </a:rPr>
+              <a:t>, mAP</a:t>
+            </a:r>
           </a:p>
           <a:p>
             <a:pPr marL="285750" indent="-285750">
@@ -5511,9 +5620,15 @@
               <a:rPr lang="ko-KR" altLang="en-US" sz="1600">
                 <a:latin typeface="+mn-ea"/>
               </a:rPr>
-              <a:t>개선 방향 등</a:t>
-            </a:r>
-            <a:endParaRPr lang="en-US" altLang="ko-KR" sz="1600">
+              <a:t>학습 시간 등</a:t>
+            </a:r>
+            <a:r>
+              <a:rPr lang="en-US" altLang="ko-KR" sz="1600">
+                <a:latin typeface="+mn-ea"/>
+              </a:rPr>
+              <a:t>…</a:t>
+            </a:r>
+            <a:endParaRPr lang="en-US" altLang="ko-KR" sz="1600" dirty="0">
               <a:latin typeface="+mn-ea"/>
             </a:endParaRPr>
           </a:p>
@@ -5521,10 +5636,10 @@
       </p:sp>
       <p:pic>
         <p:nvPicPr>
-          <p:cNvPr id="24" name="그림 23">
+          <p:cNvPr id="3" name="그림 2">
             <a:extLst>
               <a:ext uri="{FF2B5EF4-FFF2-40B4-BE49-F238E27FC236}">
-                <a16:creationId xmlns:a16="http://schemas.microsoft.com/office/drawing/2014/main" id="{FA7C8EE4-38ED-24B6-E5AB-BC35C77CEF07}"/>
+                <a16:creationId xmlns:a16="http://schemas.microsoft.com/office/drawing/2014/main" id="{D62B0F9C-F1AD-DDBC-6380-9E4FF8485A2A}"/>
               </a:ext>
             </a:extLst>
           </p:cNvPr>
@@ -5533,15 +5648,16 @@
           </p:cNvPicPr>
           <p:nvPr/>
         </p:nvPicPr>
-        <p:blipFill rotWithShape="1">
+        <p:blipFill>
           <a:blip r:embed="rId3"/>
-          <a:srcRect t="25289" r="35038" b="16067"/>
-          <a:stretch/>
+          <a:stretch>
+            <a:fillRect/>
+          </a:stretch>
         </p:blipFill>
         <p:spPr>
           <a:xfrm>
-            <a:off x="1141260" y="1475997"/>
-            <a:ext cx="6513839" cy="1171930"/>
+            <a:off x="327276" y="3782342"/>
+            <a:ext cx="8529154" cy="2686747"/>
           </a:xfrm>
           <a:prstGeom prst="rect">
             <a:avLst/>
@@ -5551,7 +5667,7 @@
     </p:spTree>
     <p:extLst>
       <p:ext uri="{BB962C8B-B14F-4D97-AF65-F5344CB8AC3E}">
-        <p14:creationId xmlns:p14="http://schemas.microsoft.com/office/powerpoint/2010/main" val="2543297788"/>
+        <p14:creationId xmlns:p14="http://schemas.microsoft.com/office/powerpoint/2010/main" val="4286634692"/>
       </p:ext>
     </p:extLst>
   </p:cSld>
@@ -5833,27 +5949,27 @@
           <a:noFill/>
         </p:spPr>
         <p:txBody>
-          <a:bodyPr wrap="square" lIns="91440" tIns="45720" rIns="91440" bIns="45720" rtlCol="0" anchor="t">
+          <a:bodyPr wrap="square" rtlCol="0">
             <a:spAutoFit/>
           </a:bodyPr>
           <a:lstStyle/>
           <a:p>
             <a:r>
-              <a:rPr lang="ko-KR" altLang="en-US" sz="3200" dirty="0">
+              <a:rPr lang="ko-KR" altLang="en-US" sz="3200">
                 <a:solidFill>
                   <a:schemeClr val="tx2"/>
                 </a:solidFill>
-                <a:latin typeface="HY견고딕"/>
-                <a:ea typeface="HY견고딕"/>
+                <a:latin typeface="HY견고딕" panose="02030600000101010101" pitchFamily="18" charset="-127"/>
+                <a:ea typeface="HY견고딕" panose="02030600000101010101" pitchFamily="18" charset="-127"/>
               </a:rPr>
               <a:t>결과 및 토의</a:t>
             </a:r>
-            <a:endParaRPr lang="en-US" altLang="ko-KR" sz="3200" dirty="0">
+            <a:endParaRPr lang="ko-KR" altLang="en-US" sz="3200" dirty="0">
               <a:solidFill>
                 <a:schemeClr val="tx2"/>
               </a:solidFill>
-              <a:latin typeface="HY견고딕"/>
-              <a:ea typeface="HY견고딕"/>
+              <a:latin typeface="HY견고딕" panose="02030600000101010101" pitchFamily="18" charset="-127"/>
+              <a:ea typeface="HY견고딕" panose="02030600000101010101" pitchFamily="18" charset="-127"/>
             </a:endParaRPr>
           </a:p>
         </p:txBody>
@@ -5881,7 +5997,7 @@
           <a:noFill/>
         </p:spPr>
         <p:txBody>
-          <a:bodyPr wrap="square" lIns="91440" tIns="45720" rIns="91440" bIns="45720" rtlCol="0" anchor="t">
+          <a:bodyPr wrap="square" rtlCol="0">
             <a:spAutoFit/>
           </a:bodyPr>
           <a:lstStyle/>
@@ -5892,70 +6008,265 @@
               </a:lnSpc>
             </a:pPr>
             <a:r>
-              <a:rPr lang="ko-KR" altLang="en-US" sz="2000" b="1" dirty="0">
-                <a:latin typeface="맑은 고딕"/>
-                <a:ea typeface="맑은 고딕"/>
-              </a:rPr>
-              <a:t>토의 </a:t>
-            </a:r>
-            <a:r>
               <a:rPr lang="ko-KR" altLang="en-US" sz="2000" b="1">
-                <a:latin typeface="맑은 고딕"/>
-                <a:ea typeface="맑은 고딕"/>
-              </a:rPr>
-              <a:t>및 개선점</a:t>
-            </a:r>
-            <a:endParaRPr lang="en-US" altLang="ko-KR" sz="1600">
-              <a:latin typeface="맑은 고딕"/>
-              <a:ea typeface="맑은 고딕"/>
+                <a:latin typeface="+mn-ea"/>
+              </a:rPr>
+              <a:t>검증 결과</a:t>
+            </a:r>
+            <a:br>
+              <a:rPr lang="en-US" altLang="ko-KR" sz="2000" b="1">
+                <a:latin typeface="+mn-ea"/>
+              </a:rPr>
+            </a:br>
+            <a:r>
+              <a:rPr lang="en-US" altLang="ko-KR" sz="1600">
+                <a:latin typeface="+mn-ea"/>
+              </a:rPr>
+              <a:t>  - Confusion matrix </a:t>
+            </a:r>
+            <a:r>
+              <a:rPr lang="ko-KR" altLang="en-US" sz="1600">
+                <a:latin typeface="+mn-ea"/>
+              </a:rPr>
+              <a:t>및 평가지표</a:t>
+            </a:r>
+            <a:br>
+              <a:rPr lang="en-US" altLang="ko-KR" sz="1600" dirty="0">
+                <a:latin typeface="+mn-ea"/>
+              </a:rPr>
+            </a:br>
+            <a:r>
+              <a:rPr lang="en-US" altLang="ko-KR" sz="1600">
+                <a:latin typeface="+mn-ea"/>
+              </a:rPr>
+              <a:t>  - train:val = 8:2 … </a:t>
+            </a:r>
+            <a:endParaRPr lang="en-US" altLang="ko-KR" sz="1600" dirty="0">
+              <a:latin typeface="+mn-ea"/>
             </a:endParaRPr>
           </a:p>
-          <a:p>
-            <a:pPr marL="285750" indent="-285750">
-              <a:lnSpc>
-                <a:spcPts val="2300"/>
-              </a:lnSpc>
-              <a:buFontTx/>
-              <a:buChar char="-"/>
-            </a:pPr>
-            <a:r>
-              <a:rPr lang="ko-KR" altLang="en-US" sz="1600">
-                <a:latin typeface="맑은 고딕"/>
-                <a:ea typeface="맑은 고딕"/>
-              </a:rPr>
-              <a:t>결과에 대한 고찰 및 미비점</a:t>
-            </a:r>
-            <a:endParaRPr lang="en-US" altLang="ko-KR" sz="1600">
-              <a:latin typeface="맑은 고딕"/>
-              <a:ea typeface="맑은 고딕"/>
-            </a:endParaRPr>
-          </a:p>
-          <a:p>
-            <a:pPr marL="285750" indent="-285750">
-              <a:lnSpc>
-                <a:spcPts val="2300"/>
-              </a:lnSpc>
-              <a:buFontTx/>
-              <a:buChar char="-"/>
-            </a:pPr>
-            <a:r>
-              <a:rPr lang="ko-KR" altLang="en-US" sz="1600">
-                <a:latin typeface="맑은 고딕"/>
-                <a:ea typeface="맑은 고딕"/>
-              </a:rPr>
-              <a:t>느낀 점 등</a:t>
-            </a:r>
-            <a:endParaRPr lang="en-US" altLang="ko-KR" sz="1600" dirty="0">
-              <a:latin typeface="맑은 고딕"/>
-              <a:ea typeface="맑은 고딕"/>
-            </a:endParaRPr>
-          </a:p>
-        </p:txBody>
-      </p:sp>
+        </p:txBody>
+      </p:sp>
+      <p:sp>
+        <p:nvSpPr>
+          <p:cNvPr id="2" name="Rectangle 2">
+            <a:extLst>
+              <a:ext uri="{FF2B5EF4-FFF2-40B4-BE49-F238E27FC236}">
+                <a16:creationId xmlns:a16="http://schemas.microsoft.com/office/drawing/2014/main" id="{E057CE83-A631-4F97-B4D5-A931F02A9187}"/>
+              </a:ext>
+            </a:extLst>
+          </p:cNvPr>
+          <p:cNvSpPr>
+            <a:spLocks noChangeArrowheads="1"/>
+          </p:cNvSpPr>
+          <p:nvPr/>
+        </p:nvSpPr>
+        <p:spPr bwMode="auto">
+          <a:xfrm>
+            <a:off x="1801018" y="4113306"/>
+            <a:ext cx="9144000" cy="457200"/>
+          </a:xfrm>
+          <a:prstGeom prst="rect">
+            <a:avLst/>
+          </a:prstGeom>
+          <a:noFill/>
+          <a:ln>
+            <a:noFill/>
+          </a:ln>
+          <a:effectLst/>
+          <a:extLst>
+            <a:ext uri="{909E8E84-426E-40DD-AFC4-6F175D3DCCD1}">
+              <a14:hiddenFill xmlns:a14="http://schemas.microsoft.com/office/drawing/2010/main">
+                <a:solidFill>
+                  <a:schemeClr val="accent1"/>
+                </a:solidFill>
+              </a14:hiddenFill>
+            </a:ext>
+            <a:ext uri="{91240B29-F687-4F45-9708-019B960494DF}">
+              <a14:hiddenLine xmlns:a14="http://schemas.microsoft.com/office/drawing/2010/main" w="9525">
+                <a:solidFill>
+                  <a:schemeClr val="tx1"/>
+                </a:solidFill>
+                <a:miter lim="800000"/>
+                <a:headEnd/>
+                <a:tailEnd/>
+              </a14:hiddenLine>
+            </a:ext>
+            <a:ext uri="{AF507438-7753-43E0-B8FC-AC1667EBCBE1}">
+              <a14:hiddenEffects xmlns:a14="http://schemas.microsoft.com/office/drawing/2010/main">
+                <a:effectLst>
+                  <a:outerShdw dist="35921" dir="2700000" algn="ctr" rotWithShape="0">
+                    <a:schemeClr val="bg2"/>
+                  </a:outerShdw>
+                </a:effectLst>
+              </a14:hiddenEffects>
+            </a:ext>
+          </a:extLst>
+        </p:spPr>
+        <p:txBody>
+          <a:bodyPr vert="horz" wrap="none" lIns="91440" tIns="45720" rIns="91440" bIns="45720" numCol="1" anchor="ctr" anchorCtr="0" compatLnSpc="1">
+            <a:prstTxWarp prst="textNoShape">
+              <a:avLst/>
+            </a:prstTxWarp>
+            <a:spAutoFit/>
+          </a:bodyPr>
+          <a:lstStyle/>
+          <a:p>
+            <a:endParaRPr lang="ko-KR" altLang="en-US"/>
+          </a:p>
+        </p:txBody>
+      </p:sp>
+      <p:pic>
+        <p:nvPicPr>
+          <p:cNvPr id="13" name="그림 12">
+            <a:extLst>
+              <a:ext uri="{FF2B5EF4-FFF2-40B4-BE49-F238E27FC236}">
+                <a16:creationId xmlns:a16="http://schemas.microsoft.com/office/drawing/2014/main" id="{CED5E422-547F-1CFD-5790-D35EA784472C}"/>
+              </a:ext>
+            </a:extLst>
+          </p:cNvPr>
+          <p:cNvPicPr>
+            <a:picLocks noChangeAspect="1"/>
+          </p:cNvPicPr>
+          <p:nvPr/>
+        </p:nvPicPr>
+        <p:blipFill rotWithShape="1">
+          <a:blip r:embed="rId3"/>
+          <a:srcRect r="35593"/>
+          <a:stretch/>
+        </p:blipFill>
+        <p:spPr>
+          <a:xfrm>
+            <a:off x="1229907" y="1918780"/>
+            <a:ext cx="6684186" cy="1679122"/>
+          </a:xfrm>
+          <a:prstGeom prst="rect">
+            <a:avLst/>
+          </a:prstGeom>
+        </p:spPr>
+      </p:pic>
+      <p:pic>
+        <p:nvPicPr>
+          <p:cNvPr id="19" name="그림 18">
+            <a:extLst>
+              <a:ext uri="{FF2B5EF4-FFF2-40B4-BE49-F238E27FC236}">
+                <a16:creationId xmlns:a16="http://schemas.microsoft.com/office/drawing/2014/main" id="{3D451981-BE28-BC4D-481B-FEF087F2504B}"/>
+              </a:ext>
+            </a:extLst>
+          </p:cNvPr>
+          <p:cNvPicPr>
+            <a:picLocks noChangeAspect="1"/>
+          </p:cNvPicPr>
+          <p:nvPr/>
+        </p:nvPicPr>
+        <p:blipFill rotWithShape="1">
+          <a:blip r:embed="rId4"/>
+          <a:srcRect r="32005"/>
+          <a:stretch/>
+        </p:blipFill>
+        <p:spPr>
+          <a:xfrm>
+            <a:off x="899592" y="3856355"/>
+            <a:ext cx="3240359" cy="2688163"/>
+          </a:xfrm>
+          <a:prstGeom prst="rect">
+            <a:avLst/>
+          </a:prstGeom>
+        </p:spPr>
+      </p:pic>
+      <p:pic>
+        <p:nvPicPr>
+          <p:cNvPr id="20" name="그림 19">
+            <a:extLst>
+              <a:ext uri="{FF2B5EF4-FFF2-40B4-BE49-F238E27FC236}">
+                <a16:creationId xmlns:a16="http://schemas.microsoft.com/office/drawing/2014/main" id="{F478B0CA-6918-2B0F-47A0-65C455119CAB}"/>
+              </a:ext>
+            </a:extLst>
+          </p:cNvPr>
+          <p:cNvPicPr>
+            <a:picLocks noChangeAspect="1"/>
+          </p:cNvPicPr>
+          <p:nvPr/>
+        </p:nvPicPr>
+        <p:blipFill>
+          <a:blip r:embed="rId5"/>
+          <a:stretch>
+            <a:fillRect/>
+          </a:stretch>
+        </p:blipFill>
+        <p:spPr>
+          <a:xfrm>
+            <a:off x="5216089" y="3650195"/>
+            <a:ext cx="3028319" cy="2894323"/>
+          </a:xfrm>
+          <a:prstGeom prst="rect">
+            <a:avLst/>
+          </a:prstGeom>
+        </p:spPr>
+      </p:pic>
+      <p:pic>
+        <p:nvPicPr>
+          <p:cNvPr id="21" name="그림 20">
+            <a:extLst>
+              <a:ext uri="{FF2B5EF4-FFF2-40B4-BE49-F238E27FC236}">
+                <a16:creationId xmlns:a16="http://schemas.microsoft.com/office/drawing/2014/main" id="{29AA96CC-8BB6-0B42-21D4-6E2301BEA0AF}"/>
+              </a:ext>
+            </a:extLst>
+          </p:cNvPr>
+          <p:cNvPicPr>
+            <a:picLocks noChangeAspect="1"/>
+          </p:cNvPicPr>
+          <p:nvPr/>
+        </p:nvPicPr>
+        <p:blipFill>
+          <a:blip r:embed="rId6"/>
+          <a:stretch>
+            <a:fillRect/>
+          </a:stretch>
+        </p:blipFill>
+        <p:spPr>
+          <a:xfrm>
+            <a:off x="5796136" y="5262697"/>
+            <a:ext cx="1883627" cy="632313"/>
+          </a:xfrm>
+          <a:prstGeom prst="rect">
+            <a:avLst/>
+          </a:prstGeom>
+        </p:spPr>
+      </p:pic>
+      <p:pic>
+        <p:nvPicPr>
+          <p:cNvPr id="22" name="그림 21">
+            <a:extLst>
+              <a:ext uri="{FF2B5EF4-FFF2-40B4-BE49-F238E27FC236}">
+                <a16:creationId xmlns:a16="http://schemas.microsoft.com/office/drawing/2014/main" id="{32D8B2C7-317B-2B1C-4A4E-CF7265435892}"/>
+              </a:ext>
+            </a:extLst>
+          </p:cNvPr>
+          <p:cNvPicPr>
+            <a:picLocks noChangeAspect="1"/>
+          </p:cNvPicPr>
+          <p:nvPr/>
+        </p:nvPicPr>
+        <p:blipFill rotWithShape="1">
+          <a:blip r:embed="rId4"/>
+          <a:srcRect l="66994" b="82094"/>
+          <a:stretch/>
+        </p:blipFill>
+        <p:spPr>
+          <a:xfrm>
+            <a:off x="1499021" y="5262697"/>
+            <a:ext cx="2032916" cy="717816"/>
+          </a:xfrm>
+          <a:prstGeom prst="rect">
+            <a:avLst/>
+          </a:prstGeom>
+        </p:spPr>
+      </p:pic>
     </p:spTree>
     <p:extLst>
       <p:ext uri="{BB962C8B-B14F-4D97-AF65-F5344CB8AC3E}">
-        <p14:creationId xmlns:p14="http://schemas.microsoft.com/office/powerpoint/2010/main" val="3313995737"/>
+        <p14:creationId xmlns:p14="http://schemas.microsoft.com/office/powerpoint/2010/main" val="3760288516"/>
       </p:ext>
     </p:extLst>
   </p:cSld>
@@ -5966,84 +6277,6 @@
 </file>
 
 <file path=ppt/slides/slide12.xml><?xml version="1.0" encoding="utf-8"?>
-<p:sld xmlns:a="http://schemas.openxmlformats.org/drawingml/2006/main" xmlns:r="http://schemas.openxmlformats.org/officeDocument/2006/relationships" xmlns:p="http://schemas.openxmlformats.org/presentationml/2006/main">
-  <p:cSld>
-    <p:spTree>
-      <p:nvGrpSpPr>
-        <p:cNvPr id="1" name=""/>
-        <p:cNvGrpSpPr/>
-        <p:nvPr/>
-      </p:nvGrpSpPr>
-      <p:grpSpPr>
-        <a:xfrm>
-          <a:off x="0" y="0"/>
-          <a:ext cx="0" cy="0"/>
-          <a:chOff x="0" y="0"/>
-          <a:chExt cx="0" cy="0"/>
-        </a:xfrm>
-      </p:grpSpPr>
-      <p:sp>
-        <p:nvSpPr>
-          <p:cNvPr id="12" name="직사각형 11"/>
-          <p:cNvSpPr/>
-          <p:nvPr/>
-        </p:nvSpPr>
-        <p:spPr>
-          <a:xfrm>
-            <a:off x="564310" y="2828835"/>
-            <a:ext cx="8015380" cy="1200329"/>
-          </a:xfrm>
-          <a:prstGeom prst="rect">
-            <a:avLst/>
-          </a:prstGeom>
-        </p:spPr>
-        <p:txBody>
-          <a:bodyPr wrap="square">
-            <a:spAutoFit/>
-          </a:bodyPr>
-          <a:lstStyle/>
-          <a:p>
-            <a:pPr algn="ctr" defTabSz="1330325" eaLnBrk="0" latinLnBrk="0" hangingPunct="0">
-              <a:buSzPct val="100000"/>
-              <a:defRPr/>
-            </a:pPr>
-            <a:r>
-              <a:rPr lang="ko-KR" altLang="en-US" sz="7200" kern="0" spc="-150" dirty="0">
-                <a:gradFill>
-                  <a:gsLst>
-                    <a:gs pos="0">
-                      <a:srgbClr val="1F497D">
-                        <a:lumMod val="50000"/>
-                      </a:srgbClr>
-                    </a:gs>
-                    <a:gs pos="100000">
-                      <a:srgbClr val="004D86"/>
-                    </a:gs>
-                  </a:gsLst>
-                  <a:lin ang="5400000" scaled="0"/>
-                </a:gradFill>
-                <a:latin typeface="HY헤드라인M" panose="02030600000101010101" pitchFamily="18" charset="-127"/>
-                <a:ea typeface="HY헤드라인M" panose="02030600000101010101" pitchFamily="18" charset="-127"/>
-              </a:rPr>
-              <a:t>감사합니다</a:t>
-            </a:r>
-          </a:p>
-        </p:txBody>
-      </p:sp>
-    </p:spTree>
-    <p:extLst>
-      <p:ext uri="{BB962C8B-B14F-4D97-AF65-F5344CB8AC3E}">
-        <p14:creationId xmlns:p14="http://schemas.microsoft.com/office/powerpoint/2010/main" val="3978517203"/>
-      </p:ext>
-    </p:extLst>
-  </p:cSld>
-  <p:clrMapOvr>
-    <a:masterClrMapping/>
-  </p:clrMapOvr>
-</p:sld>
-</file>
-
-<file path=ppt/slides/slide2.xml><?xml version="1.0" encoding="utf-8"?>
 <p:sld xmlns:a="http://schemas.openxmlformats.org/drawingml/2006/main" xmlns:r="http://schemas.openxmlformats.org/officeDocument/2006/relationships" xmlns:p="http://schemas.openxmlformats.org/presentationml/2006/main">
   <p:cSld>
     <p:spTree>
@@ -6328,6 +6561,984 @@
                 <a:latin typeface="HY견고딕" panose="02030600000101010101" pitchFamily="18" charset="-127"/>
                 <a:ea typeface="HY견고딕" panose="02030600000101010101" pitchFamily="18" charset="-127"/>
               </a:rPr>
+              <a:t>결과 및 토의</a:t>
+            </a:r>
+            <a:endParaRPr lang="ko-KR" altLang="en-US" sz="3200" dirty="0">
+              <a:solidFill>
+                <a:schemeClr val="tx2"/>
+              </a:solidFill>
+              <a:latin typeface="HY견고딕" panose="02030600000101010101" pitchFamily="18" charset="-127"/>
+              <a:ea typeface="HY견고딕" panose="02030600000101010101" pitchFamily="18" charset="-127"/>
+            </a:endParaRPr>
+          </a:p>
+        </p:txBody>
+      </p:sp>
+      <p:sp>
+        <p:nvSpPr>
+          <p:cNvPr id="9" name="TextBox 8">
+            <a:extLst>
+              <a:ext uri="{FF2B5EF4-FFF2-40B4-BE49-F238E27FC236}">
+                <a16:creationId xmlns:a16="http://schemas.microsoft.com/office/drawing/2014/main" id="{3FA87A73-3FF2-4334-AD42-AEC104EEA300}"/>
+              </a:ext>
+            </a:extLst>
+          </p:cNvPr>
+          <p:cNvSpPr txBox="1"/>
+          <p:nvPr/>
+        </p:nvSpPr>
+        <p:spPr>
+          <a:xfrm>
+            <a:off x="155912" y="944638"/>
+            <a:ext cx="8706254" cy="3012812"/>
+          </a:xfrm>
+          <a:prstGeom prst="rect">
+            <a:avLst/>
+          </a:prstGeom>
+          <a:noFill/>
+        </p:spPr>
+        <p:txBody>
+          <a:bodyPr wrap="square" rtlCol="0">
+            <a:spAutoFit/>
+          </a:bodyPr>
+          <a:lstStyle/>
+          <a:p>
+            <a:pPr>
+              <a:lnSpc>
+                <a:spcPts val="2300"/>
+              </a:lnSpc>
+            </a:pPr>
+            <a:r>
+              <a:rPr lang="ko-KR" altLang="en-US" sz="2000" b="1">
+                <a:latin typeface="+mn-ea"/>
+              </a:rPr>
+              <a:t>테스트 결과</a:t>
+            </a:r>
+            <a:endParaRPr lang="en-US" altLang="ko-KR" sz="2000" b="1">
+              <a:latin typeface="+mn-ea"/>
+            </a:endParaRPr>
+          </a:p>
+          <a:p>
+            <a:pPr>
+              <a:lnSpc>
+                <a:spcPts val="2300"/>
+              </a:lnSpc>
+            </a:pPr>
+            <a:endParaRPr lang="en-US" altLang="ko-KR" sz="2000" b="1">
+              <a:latin typeface="+mn-ea"/>
+            </a:endParaRPr>
+          </a:p>
+          <a:p>
+            <a:pPr>
+              <a:lnSpc>
+                <a:spcPts val="2300"/>
+              </a:lnSpc>
+            </a:pPr>
+            <a:endParaRPr lang="en-US" altLang="ko-KR" sz="2000" b="1">
+              <a:latin typeface="+mn-ea"/>
+            </a:endParaRPr>
+          </a:p>
+          <a:p>
+            <a:pPr>
+              <a:lnSpc>
+                <a:spcPts val="2300"/>
+              </a:lnSpc>
+            </a:pPr>
+            <a:endParaRPr lang="en-US" altLang="ko-KR" sz="2000" b="1">
+              <a:latin typeface="+mn-ea"/>
+            </a:endParaRPr>
+          </a:p>
+          <a:p>
+            <a:pPr>
+              <a:lnSpc>
+                <a:spcPts val="2300"/>
+              </a:lnSpc>
+            </a:pPr>
+            <a:endParaRPr lang="en-US" altLang="ko-KR" sz="2000" b="1">
+              <a:latin typeface="+mn-ea"/>
+            </a:endParaRPr>
+          </a:p>
+          <a:p>
+            <a:pPr>
+              <a:lnSpc>
+                <a:spcPts val="2300"/>
+              </a:lnSpc>
+            </a:pPr>
+            <a:endParaRPr lang="en-US" altLang="ko-KR" sz="1600">
+              <a:latin typeface="+mn-ea"/>
+            </a:endParaRPr>
+          </a:p>
+          <a:p>
+            <a:pPr>
+              <a:lnSpc>
+                <a:spcPts val="2300"/>
+              </a:lnSpc>
+            </a:pPr>
+            <a:endParaRPr lang="en-US" altLang="ko-KR" sz="1600">
+              <a:latin typeface="+mn-ea"/>
+            </a:endParaRPr>
+          </a:p>
+          <a:p>
+            <a:pPr>
+              <a:lnSpc>
+                <a:spcPts val="2300"/>
+              </a:lnSpc>
+            </a:pPr>
+            <a:r>
+              <a:rPr lang="ko-KR" altLang="en-US" sz="2000" b="1">
+                <a:latin typeface="+mn-ea"/>
+              </a:rPr>
+              <a:t>오분류 사례 및 개선점</a:t>
+            </a:r>
+            <a:endParaRPr lang="en-US" altLang="ko-KR" sz="2000" b="1">
+              <a:latin typeface="+mn-ea"/>
+            </a:endParaRPr>
+          </a:p>
+          <a:p>
+            <a:pPr marL="285750" indent="-285750">
+              <a:lnSpc>
+                <a:spcPts val="2300"/>
+              </a:lnSpc>
+              <a:buFontTx/>
+              <a:buChar char="-"/>
+            </a:pPr>
+            <a:r>
+              <a:rPr lang="ko-KR" altLang="en-US" sz="1600">
+                <a:latin typeface="+mn-ea"/>
+              </a:rPr>
+              <a:t>제공 받은 테스트 데이터셋에서 발생한 오분류 사례 분석</a:t>
+            </a:r>
+            <a:endParaRPr lang="en-US" altLang="ko-KR" sz="1600">
+              <a:latin typeface="+mn-ea"/>
+            </a:endParaRPr>
+          </a:p>
+          <a:p>
+            <a:pPr marL="285750" indent="-285750">
+              <a:lnSpc>
+                <a:spcPts val="2300"/>
+              </a:lnSpc>
+              <a:buFontTx/>
+              <a:buChar char="-"/>
+            </a:pPr>
+            <a:r>
+              <a:rPr lang="ko-KR" altLang="en-US" sz="1600">
+                <a:latin typeface="+mn-ea"/>
+              </a:rPr>
+              <a:t>개선 방향 등</a:t>
+            </a:r>
+            <a:endParaRPr lang="en-US" altLang="ko-KR" sz="1600">
+              <a:latin typeface="+mn-ea"/>
+            </a:endParaRPr>
+          </a:p>
+        </p:txBody>
+      </p:sp>
+      <p:pic>
+        <p:nvPicPr>
+          <p:cNvPr id="24" name="그림 23">
+            <a:extLst>
+              <a:ext uri="{FF2B5EF4-FFF2-40B4-BE49-F238E27FC236}">
+                <a16:creationId xmlns:a16="http://schemas.microsoft.com/office/drawing/2014/main" id="{FA7C8EE4-38ED-24B6-E5AB-BC35C77CEF07}"/>
+              </a:ext>
+            </a:extLst>
+          </p:cNvPr>
+          <p:cNvPicPr>
+            <a:picLocks noChangeAspect="1"/>
+          </p:cNvPicPr>
+          <p:nvPr/>
+        </p:nvPicPr>
+        <p:blipFill rotWithShape="1">
+          <a:blip r:embed="rId3"/>
+          <a:srcRect t="25289" r="35038" b="16067"/>
+          <a:stretch/>
+        </p:blipFill>
+        <p:spPr>
+          <a:xfrm>
+            <a:off x="1141260" y="1475997"/>
+            <a:ext cx="6513839" cy="1171930"/>
+          </a:xfrm>
+          <a:prstGeom prst="rect">
+            <a:avLst/>
+          </a:prstGeom>
+        </p:spPr>
+      </p:pic>
+    </p:spTree>
+    <p:extLst>
+      <p:ext uri="{BB962C8B-B14F-4D97-AF65-F5344CB8AC3E}">
+        <p14:creationId xmlns:p14="http://schemas.microsoft.com/office/powerpoint/2010/main" val="2543297788"/>
+      </p:ext>
+    </p:extLst>
+  </p:cSld>
+  <p:clrMapOvr>
+    <a:masterClrMapping/>
+  </p:clrMapOvr>
+</p:sld>
+</file>
+
+<file path=ppt/slides/slide13.xml><?xml version="1.0" encoding="utf-8"?>
+<p:sld xmlns:a="http://schemas.openxmlformats.org/drawingml/2006/main" xmlns:r="http://schemas.openxmlformats.org/officeDocument/2006/relationships" xmlns:p="http://schemas.openxmlformats.org/presentationml/2006/main">
+  <p:cSld>
+    <p:spTree>
+      <p:nvGrpSpPr>
+        <p:cNvPr id="1" name=""/>
+        <p:cNvGrpSpPr/>
+        <p:nvPr/>
+      </p:nvGrpSpPr>
+      <p:grpSpPr>
+        <a:xfrm>
+          <a:off x="0" y="0"/>
+          <a:ext cx="0" cy="0"/>
+          <a:chOff x="0" y="0"/>
+          <a:chExt cx="0" cy="0"/>
+        </a:xfrm>
+      </p:grpSpPr>
+      <p:sp>
+        <p:nvSpPr>
+          <p:cNvPr id="5" name="TextBox 4"/>
+          <p:cNvSpPr txBox="1"/>
+          <p:nvPr/>
+        </p:nvSpPr>
+        <p:spPr>
+          <a:xfrm>
+            <a:off x="521796" y="620688"/>
+            <a:ext cx="1656184" cy="523220"/>
+          </a:xfrm>
+          <a:prstGeom prst="rect">
+            <a:avLst/>
+          </a:prstGeom>
+          <a:noFill/>
+        </p:spPr>
+        <p:txBody>
+          <a:bodyPr wrap="square" rtlCol="0">
+            <a:spAutoFit/>
+          </a:bodyPr>
+          <a:lstStyle/>
+          <a:p>
+            <a:r>
+              <a:rPr lang="ko-KR" altLang="en-US" sz="2800">
+                <a:solidFill>
+                  <a:schemeClr val="bg1"/>
+                </a:solidFill>
+                <a:latin typeface="바른돋움 3" panose="02020603020101020101" pitchFamily="18" charset="-127"/>
+                <a:ea typeface="문체부 제목 돋음체" pitchFamily="49" charset="-127"/>
+              </a:rPr>
+              <a:t>세부일정</a:t>
+            </a:r>
+            <a:endParaRPr lang="ko-KR" altLang="en-US" sz="2800" dirty="0">
+              <a:solidFill>
+                <a:schemeClr val="bg1"/>
+              </a:solidFill>
+              <a:latin typeface="바른돋움 3" panose="02020603020101020101" pitchFamily="18" charset="-127"/>
+              <a:ea typeface="문체부 제목 돋음체" pitchFamily="49" charset="-127"/>
+            </a:endParaRPr>
+          </a:p>
+        </p:txBody>
+      </p:sp>
+      <p:grpSp>
+        <p:nvGrpSpPr>
+          <p:cNvPr id="15" name="그룹 14"/>
+          <p:cNvGrpSpPr/>
+          <p:nvPr/>
+        </p:nvGrpSpPr>
+        <p:grpSpPr>
+          <a:xfrm>
+            <a:off x="-23601" y="761647"/>
+            <a:ext cx="9144000" cy="76200"/>
+            <a:chOff x="0" y="3756786"/>
+            <a:chExt cx="9144000" cy="76200"/>
+          </a:xfrm>
+        </p:grpSpPr>
+        <p:sp>
+          <p:nvSpPr>
+            <p:cNvPr id="16" name="직사각형 15"/>
+            <p:cNvSpPr/>
+            <p:nvPr/>
+          </p:nvSpPr>
+          <p:spPr>
+            <a:xfrm>
+              <a:off x="179513" y="3756786"/>
+              <a:ext cx="5187280" cy="76200"/>
+            </a:xfrm>
+            <a:prstGeom prst="rect">
+              <a:avLst/>
+            </a:prstGeom>
+            <a:solidFill>
+              <a:srgbClr val="005094"/>
+            </a:solidFill>
+            <a:ln w="28575">
+              <a:noFill/>
+            </a:ln>
+          </p:spPr>
+          <p:style>
+            <a:lnRef idx="2">
+              <a:schemeClr val="accent1">
+                <a:shade val="50000"/>
+              </a:schemeClr>
+            </a:lnRef>
+            <a:fillRef idx="1">
+              <a:schemeClr val="accent1"/>
+            </a:fillRef>
+            <a:effectRef idx="0">
+              <a:schemeClr val="accent1"/>
+            </a:effectRef>
+            <a:fontRef idx="minor">
+              <a:schemeClr val="lt1"/>
+            </a:fontRef>
+          </p:style>
+          <p:txBody>
+            <a:bodyPr rtlCol="0" anchor="ctr"/>
+            <a:lstStyle>
+              <a:defPPr>
+                <a:defRPr lang="ko-KR"/>
+              </a:defPPr>
+              <a:lvl1pPr marL="0" algn="l" defTabSz="914400" rtl="0" eaLnBrk="1" latinLnBrk="1" hangingPunct="1">
+                <a:defRPr sz="1800" kern="1200">
+                  <a:solidFill>
+                    <a:schemeClr val="lt1"/>
+                  </a:solidFill>
+                  <a:latin typeface="+mn-lt"/>
+                  <a:ea typeface="+mn-ea"/>
+                  <a:cs typeface="+mn-cs"/>
+                </a:defRPr>
+              </a:lvl1pPr>
+              <a:lvl2pPr marL="457200" algn="l" defTabSz="914400" rtl="0" eaLnBrk="1" latinLnBrk="1" hangingPunct="1">
+                <a:defRPr sz="1800" kern="1200">
+                  <a:solidFill>
+                    <a:schemeClr val="lt1"/>
+                  </a:solidFill>
+                  <a:latin typeface="+mn-lt"/>
+                  <a:ea typeface="+mn-ea"/>
+                  <a:cs typeface="+mn-cs"/>
+                </a:defRPr>
+              </a:lvl2pPr>
+              <a:lvl3pPr marL="914400" algn="l" defTabSz="914400" rtl="0" eaLnBrk="1" latinLnBrk="1" hangingPunct="1">
+                <a:defRPr sz="1800" kern="1200">
+                  <a:solidFill>
+                    <a:schemeClr val="lt1"/>
+                  </a:solidFill>
+                  <a:latin typeface="+mn-lt"/>
+                  <a:ea typeface="+mn-ea"/>
+                  <a:cs typeface="+mn-cs"/>
+                </a:defRPr>
+              </a:lvl3pPr>
+              <a:lvl4pPr marL="1371600" algn="l" defTabSz="914400" rtl="0" eaLnBrk="1" latinLnBrk="1" hangingPunct="1">
+                <a:defRPr sz="1800" kern="1200">
+                  <a:solidFill>
+                    <a:schemeClr val="lt1"/>
+                  </a:solidFill>
+                  <a:latin typeface="+mn-lt"/>
+                  <a:ea typeface="+mn-ea"/>
+                  <a:cs typeface="+mn-cs"/>
+                </a:defRPr>
+              </a:lvl4pPr>
+              <a:lvl5pPr marL="1828800" algn="l" defTabSz="914400" rtl="0" eaLnBrk="1" latinLnBrk="1" hangingPunct="1">
+                <a:defRPr sz="1800" kern="1200">
+                  <a:solidFill>
+                    <a:schemeClr val="lt1"/>
+                  </a:solidFill>
+                  <a:latin typeface="+mn-lt"/>
+                  <a:ea typeface="+mn-ea"/>
+                  <a:cs typeface="+mn-cs"/>
+                </a:defRPr>
+              </a:lvl5pPr>
+              <a:lvl6pPr marL="2286000" algn="l" defTabSz="914400" rtl="0" eaLnBrk="1" latinLnBrk="1" hangingPunct="1">
+                <a:defRPr sz="1800" kern="1200">
+                  <a:solidFill>
+                    <a:schemeClr val="lt1"/>
+                  </a:solidFill>
+                  <a:latin typeface="+mn-lt"/>
+                  <a:ea typeface="+mn-ea"/>
+                  <a:cs typeface="+mn-cs"/>
+                </a:defRPr>
+              </a:lvl6pPr>
+              <a:lvl7pPr marL="2743200" algn="l" defTabSz="914400" rtl="0" eaLnBrk="1" latinLnBrk="1" hangingPunct="1">
+                <a:defRPr sz="1800" kern="1200">
+                  <a:solidFill>
+                    <a:schemeClr val="lt1"/>
+                  </a:solidFill>
+                  <a:latin typeface="+mn-lt"/>
+                  <a:ea typeface="+mn-ea"/>
+                  <a:cs typeface="+mn-cs"/>
+                </a:defRPr>
+              </a:lvl7pPr>
+              <a:lvl8pPr marL="3200400" algn="l" defTabSz="914400" rtl="0" eaLnBrk="1" latinLnBrk="1" hangingPunct="1">
+                <a:defRPr sz="1800" kern="1200">
+                  <a:solidFill>
+                    <a:schemeClr val="lt1"/>
+                  </a:solidFill>
+                  <a:latin typeface="+mn-lt"/>
+                  <a:ea typeface="+mn-ea"/>
+                  <a:cs typeface="+mn-cs"/>
+                </a:defRPr>
+              </a:lvl8pPr>
+              <a:lvl9pPr marL="3657600" algn="l" defTabSz="914400" rtl="0" eaLnBrk="1" latinLnBrk="1" hangingPunct="1">
+                <a:defRPr sz="1800" kern="1200">
+                  <a:solidFill>
+                    <a:schemeClr val="lt1"/>
+                  </a:solidFill>
+                  <a:latin typeface="+mn-lt"/>
+                  <a:ea typeface="+mn-ea"/>
+                  <a:cs typeface="+mn-cs"/>
+                </a:defRPr>
+              </a:lvl9pPr>
+            </a:lstStyle>
+            <a:p>
+              <a:pPr algn="ctr"/>
+              <a:endParaRPr lang="ko-KR" altLang="en-US" sz="2000">
+                <a:solidFill>
+                  <a:schemeClr val="bg1"/>
+                </a:solidFill>
+                <a:latin typeface="-윤고딕340" panose="02030504000101010101" pitchFamily="18" charset="-127"/>
+                <a:ea typeface="-윤고딕340" panose="02030504000101010101" pitchFamily="18" charset="-127"/>
+              </a:endParaRPr>
+            </a:p>
+          </p:txBody>
+        </p:sp>
+        <p:cxnSp>
+          <p:nvCxnSpPr>
+            <p:cNvPr id="17" name="직선 연결선 16"/>
+            <p:cNvCxnSpPr/>
+            <p:nvPr/>
+          </p:nvCxnSpPr>
+          <p:spPr>
+            <a:xfrm>
+              <a:off x="0" y="3756786"/>
+              <a:ext cx="9144000" cy="0"/>
+            </a:xfrm>
+            <a:prstGeom prst="line">
+              <a:avLst/>
+            </a:prstGeom>
+            <a:ln w="15875">
+              <a:solidFill>
+                <a:srgbClr val="005094"/>
+              </a:solidFill>
+            </a:ln>
+          </p:spPr>
+          <p:style>
+            <a:lnRef idx="1">
+              <a:schemeClr val="accent1"/>
+            </a:lnRef>
+            <a:fillRef idx="0">
+              <a:schemeClr val="accent1"/>
+            </a:fillRef>
+            <a:effectRef idx="0">
+              <a:schemeClr val="accent1"/>
+            </a:effectRef>
+            <a:fontRef idx="minor">
+              <a:schemeClr val="tx1"/>
+            </a:fontRef>
+          </p:style>
+        </p:cxnSp>
+      </p:grpSp>
+      <p:sp>
+        <p:nvSpPr>
+          <p:cNvPr id="18" name="TextBox 17"/>
+          <p:cNvSpPr txBox="1"/>
+          <p:nvPr/>
+        </p:nvSpPr>
+        <p:spPr>
+          <a:xfrm>
+            <a:off x="299927" y="105444"/>
+            <a:ext cx="8196507" cy="584775"/>
+          </a:xfrm>
+          <a:prstGeom prst="rect">
+            <a:avLst/>
+          </a:prstGeom>
+          <a:noFill/>
+        </p:spPr>
+        <p:txBody>
+          <a:bodyPr wrap="square" lIns="91440" tIns="45720" rIns="91440" bIns="45720" rtlCol="0" anchor="t">
+            <a:spAutoFit/>
+          </a:bodyPr>
+          <a:lstStyle/>
+          <a:p>
+            <a:r>
+              <a:rPr lang="ko-KR" altLang="en-US" sz="3200" dirty="0">
+                <a:solidFill>
+                  <a:schemeClr val="tx2"/>
+                </a:solidFill>
+                <a:latin typeface="HY견고딕"/>
+                <a:ea typeface="HY견고딕"/>
+              </a:rPr>
+              <a:t>결과 및 토의</a:t>
+            </a:r>
+            <a:endParaRPr lang="en-US" altLang="ko-KR" sz="3200" dirty="0">
+              <a:solidFill>
+                <a:schemeClr val="tx2"/>
+              </a:solidFill>
+              <a:latin typeface="HY견고딕"/>
+              <a:ea typeface="HY견고딕"/>
+            </a:endParaRPr>
+          </a:p>
+        </p:txBody>
+      </p:sp>
+      <p:sp>
+        <p:nvSpPr>
+          <p:cNvPr id="9" name="TextBox 8">
+            <a:extLst>
+              <a:ext uri="{FF2B5EF4-FFF2-40B4-BE49-F238E27FC236}">
+                <a16:creationId xmlns:a16="http://schemas.microsoft.com/office/drawing/2014/main" id="{3FA87A73-3FF2-4334-AD42-AEC104EEA300}"/>
+              </a:ext>
+            </a:extLst>
+          </p:cNvPr>
+          <p:cNvSpPr txBox="1"/>
+          <p:nvPr/>
+        </p:nvSpPr>
+        <p:spPr>
+          <a:xfrm>
+            <a:off x="155912" y="944638"/>
+            <a:ext cx="8706254" cy="948145"/>
+          </a:xfrm>
+          <a:prstGeom prst="rect">
+            <a:avLst/>
+          </a:prstGeom>
+          <a:noFill/>
+        </p:spPr>
+        <p:txBody>
+          <a:bodyPr wrap="square" lIns="91440" tIns="45720" rIns="91440" bIns="45720" rtlCol="0" anchor="t">
+            <a:spAutoFit/>
+          </a:bodyPr>
+          <a:lstStyle/>
+          <a:p>
+            <a:pPr>
+              <a:lnSpc>
+                <a:spcPts val="2300"/>
+              </a:lnSpc>
+            </a:pPr>
+            <a:r>
+              <a:rPr lang="ko-KR" altLang="en-US" sz="2000" b="1" dirty="0">
+                <a:latin typeface="맑은 고딕"/>
+                <a:ea typeface="맑은 고딕"/>
+              </a:rPr>
+              <a:t>토의 </a:t>
+            </a:r>
+            <a:r>
+              <a:rPr lang="ko-KR" altLang="en-US" sz="2000" b="1">
+                <a:latin typeface="맑은 고딕"/>
+                <a:ea typeface="맑은 고딕"/>
+              </a:rPr>
+              <a:t>및 개선점</a:t>
+            </a:r>
+            <a:endParaRPr lang="en-US" altLang="ko-KR" sz="1600">
+              <a:latin typeface="맑은 고딕"/>
+              <a:ea typeface="맑은 고딕"/>
+            </a:endParaRPr>
+          </a:p>
+          <a:p>
+            <a:pPr marL="285750" indent="-285750">
+              <a:lnSpc>
+                <a:spcPts val="2300"/>
+              </a:lnSpc>
+              <a:buFontTx/>
+              <a:buChar char="-"/>
+            </a:pPr>
+            <a:r>
+              <a:rPr lang="ko-KR" altLang="en-US" sz="1600">
+                <a:latin typeface="맑은 고딕"/>
+                <a:ea typeface="맑은 고딕"/>
+              </a:rPr>
+              <a:t>결과에 대한 고찰 및 미비점</a:t>
+            </a:r>
+            <a:endParaRPr lang="en-US" altLang="ko-KR" sz="1600">
+              <a:latin typeface="맑은 고딕"/>
+              <a:ea typeface="맑은 고딕"/>
+            </a:endParaRPr>
+          </a:p>
+          <a:p>
+            <a:pPr marL="285750" indent="-285750">
+              <a:lnSpc>
+                <a:spcPts val="2300"/>
+              </a:lnSpc>
+              <a:buFontTx/>
+              <a:buChar char="-"/>
+            </a:pPr>
+            <a:r>
+              <a:rPr lang="ko-KR" altLang="en-US" sz="1600">
+                <a:latin typeface="맑은 고딕"/>
+                <a:ea typeface="맑은 고딕"/>
+              </a:rPr>
+              <a:t>느낀 점 등</a:t>
+            </a:r>
+            <a:endParaRPr lang="en-US" altLang="ko-KR" sz="1600" dirty="0">
+              <a:latin typeface="맑은 고딕"/>
+              <a:ea typeface="맑은 고딕"/>
+            </a:endParaRPr>
+          </a:p>
+        </p:txBody>
+      </p:sp>
+    </p:spTree>
+    <p:extLst>
+      <p:ext uri="{BB962C8B-B14F-4D97-AF65-F5344CB8AC3E}">
+        <p14:creationId xmlns:p14="http://schemas.microsoft.com/office/powerpoint/2010/main" val="3313995737"/>
+      </p:ext>
+    </p:extLst>
+  </p:cSld>
+  <p:clrMapOvr>
+    <a:masterClrMapping/>
+  </p:clrMapOvr>
+</p:sld>
+</file>
+
+<file path=ppt/slides/slide14.xml><?xml version="1.0" encoding="utf-8"?>
+<p:sld xmlns:a="http://schemas.openxmlformats.org/drawingml/2006/main" xmlns:r="http://schemas.openxmlformats.org/officeDocument/2006/relationships" xmlns:p="http://schemas.openxmlformats.org/presentationml/2006/main">
+  <p:cSld>
+    <p:spTree>
+      <p:nvGrpSpPr>
+        <p:cNvPr id="1" name=""/>
+        <p:cNvGrpSpPr/>
+        <p:nvPr/>
+      </p:nvGrpSpPr>
+      <p:grpSpPr>
+        <a:xfrm>
+          <a:off x="0" y="0"/>
+          <a:ext cx="0" cy="0"/>
+          <a:chOff x="0" y="0"/>
+          <a:chExt cx="0" cy="0"/>
+        </a:xfrm>
+      </p:grpSpPr>
+      <p:sp>
+        <p:nvSpPr>
+          <p:cNvPr id="12" name="직사각형 11"/>
+          <p:cNvSpPr/>
+          <p:nvPr/>
+        </p:nvSpPr>
+        <p:spPr>
+          <a:xfrm>
+            <a:off x="564310" y="2828835"/>
+            <a:ext cx="8015380" cy="1200329"/>
+          </a:xfrm>
+          <a:prstGeom prst="rect">
+            <a:avLst/>
+          </a:prstGeom>
+        </p:spPr>
+        <p:txBody>
+          <a:bodyPr wrap="square">
+            <a:spAutoFit/>
+          </a:bodyPr>
+          <a:lstStyle/>
+          <a:p>
+            <a:pPr algn="ctr" defTabSz="1330325" eaLnBrk="0" latinLnBrk="0" hangingPunct="0">
+              <a:buSzPct val="100000"/>
+              <a:defRPr/>
+            </a:pPr>
+            <a:r>
+              <a:rPr lang="ko-KR" altLang="en-US" sz="7200" kern="0" spc="-150" dirty="0">
+                <a:gradFill>
+                  <a:gsLst>
+                    <a:gs pos="0">
+                      <a:srgbClr val="1F497D">
+                        <a:lumMod val="50000"/>
+                      </a:srgbClr>
+                    </a:gs>
+                    <a:gs pos="100000">
+                      <a:srgbClr val="004D86"/>
+                    </a:gs>
+                  </a:gsLst>
+                  <a:lin ang="5400000" scaled="0"/>
+                </a:gradFill>
+                <a:latin typeface="HY헤드라인M" panose="02030600000101010101" pitchFamily="18" charset="-127"/>
+                <a:ea typeface="HY헤드라인M" panose="02030600000101010101" pitchFamily="18" charset="-127"/>
+              </a:rPr>
+              <a:t>감사합니다</a:t>
+            </a:r>
+          </a:p>
+        </p:txBody>
+      </p:sp>
+    </p:spTree>
+    <p:extLst>
+      <p:ext uri="{BB962C8B-B14F-4D97-AF65-F5344CB8AC3E}">
+        <p14:creationId xmlns:p14="http://schemas.microsoft.com/office/powerpoint/2010/main" val="3978517203"/>
+      </p:ext>
+    </p:extLst>
+  </p:cSld>
+  <p:clrMapOvr>
+    <a:masterClrMapping/>
+  </p:clrMapOvr>
+</p:sld>
+</file>
+
+<file path=ppt/slides/slide2.xml><?xml version="1.0" encoding="utf-8"?>
+<p:sld xmlns:a="http://schemas.openxmlformats.org/drawingml/2006/main" xmlns:r="http://schemas.openxmlformats.org/officeDocument/2006/relationships" xmlns:p="http://schemas.openxmlformats.org/presentationml/2006/main">
+  <p:cSld>
+    <p:spTree>
+      <p:nvGrpSpPr>
+        <p:cNvPr id="1" name=""/>
+        <p:cNvGrpSpPr/>
+        <p:nvPr/>
+      </p:nvGrpSpPr>
+      <p:grpSpPr>
+        <a:xfrm>
+          <a:off x="0" y="0"/>
+          <a:ext cx="0" cy="0"/>
+          <a:chOff x="0" y="0"/>
+          <a:chExt cx="0" cy="0"/>
+        </a:xfrm>
+      </p:grpSpPr>
+      <p:sp>
+        <p:nvSpPr>
+          <p:cNvPr id="5" name="TextBox 4"/>
+          <p:cNvSpPr txBox="1"/>
+          <p:nvPr/>
+        </p:nvSpPr>
+        <p:spPr>
+          <a:xfrm>
+            <a:off x="521796" y="620688"/>
+            <a:ext cx="1656184" cy="523220"/>
+          </a:xfrm>
+          <a:prstGeom prst="rect">
+            <a:avLst/>
+          </a:prstGeom>
+          <a:noFill/>
+        </p:spPr>
+        <p:txBody>
+          <a:bodyPr wrap="square" rtlCol="0">
+            <a:spAutoFit/>
+          </a:bodyPr>
+          <a:lstStyle/>
+          <a:p>
+            <a:r>
+              <a:rPr lang="ko-KR" altLang="en-US" sz="2800">
+                <a:solidFill>
+                  <a:schemeClr val="bg1"/>
+                </a:solidFill>
+                <a:latin typeface="바른돋움 3" panose="02020603020101020101" pitchFamily="18" charset="-127"/>
+                <a:ea typeface="문체부 제목 돋음체" pitchFamily="49" charset="-127"/>
+              </a:rPr>
+              <a:t>세부일정</a:t>
+            </a:r>
+            <a:endParaRPr lang="ko-KR" altLang="en-US" sz="2800" dirty="0">
+              <a:solidFill>
+                <a:schemeClr val="bg1"/>
+              </a:solidFill>
+              <a:latin typeface="바른돋움 3" panose="02020603020101020101" pitchFamily="18" charset="-127"/>
+              <a:ea typeface="문체부 제목 돋음체" pitchFamily="49" charset="-127"/>
+            </a:endParaRPr>
+          </a:p>
+        </p:txBody>
+      </p:sp>
+      <p:grpSp>
+        <p:nvGrpSpPr>
+          <p:cNvPr id="15" name="그룹 14"/>
+          <p:cNvGrpSpPr/>
+          <p:nvPr/>
+        </p:nvGrpSpPr>
+        <p:grpSpPr>
+          <a:xfrm>
+            <a:off x="-23601" y="761647"/>
+            <a:ext cx="9144000" cy="76200"/>
+            <a:chOff x="0" y="3756786"/>
+            <a:chExt cx="9144000" cy="76200"/>
+          </a:xfrm>
+        </p:grpSpPr>
+        <p:sp>
+          <p:nvSpPr>
+            <p:cNvPr id="16" name="직사각형 15"/>
+            <p:cNvSpPr/>
+            <p:nvPr/>
+          </p:nvSpPr>
+          <p:spPr>
+            <a:xfrm>
+              <a:off x="179513" y="3756786"/>
+              <a:ext cx="5187280" cy="76200"/>
+            </a:xfrm>
+            <a:prstGeom prst="rect">
+              <a:avLst/>
+            </a:prstGeom>
+            <a:solidFill>
+              <a:srgbClr val="005094"/>
+            </a:solidFill>
+            <a:ln w="28575">
+              <a:noFill/>
+            </a:ln>
+          </p:spPr>
+          <p:style>
+            <a:lnRef idx="2">
+              <a:schemeClr val="accent1">
+                <a:shade val="50000"/>
+              </a:schemeClr>
+            </a:lnRef>
+            <a:fillRef idx="1">
+              <a:schemeClr val="accent1"/>
+            </a:fillRef>
+            <a:effectRef idx="0">
+              <a:schemeClr val="accent1"/>
+            </a:effectRef>
+            <a:fontRef idx="minor">
+              <a:schemeClr val="lt1"/>
+            </a:fontRef>
+          </p:style>
+          <p:txBody>
+            <a:bodyPr rtlCol="0" anchor="ctr"/>
+            <a:lstStyle>
+              <a:defPPr>
+                <a:defRPr lang="ko-KR"/>
+              </a:defPPr>
+              <a:lvl1pPr marL="0" algn="l" defTabSz="914400" rtl="0" eaLnBrk="1" latinLnBrk="1" hangingPunct="1">
+                <a:defRPr sz="1800" kern="1200">
+                  <a:solidFill>
+                    <a:schemeClr val="lt1"/>
+                  </a:solidFill>
+                  <a:latin typeface="+mn-lt"/>
+                  <a:ea typeface="+mn-ea"/>
+                  <a:cs typeface="+mn-cs"/>
+                </a:defRPr>
+              </a:lvl1pPr>
+              <a:lvl2pPr marL="457200" algn="l" defTabSz="914400" rtl="0" eaLnBrk="1" latinLnBrk="1" hangingPunct="1">
+                <a:defRPr sz="1800" kern="1200">
+                  <a:solidFill>
+                    <a:schemeClr val="lt1"/>
+                  </a:solidFill>
+                  <a:latin typeface="+mn-lt"/>
+                  <a:ea typeface="+mn-ea"/>
+                  <a:cs typeface="+mn-cs"/>
+                </a:defRPr>
+              </a:lvl2pPr>
+              <a:lvl3pPr marL="914400" algn="l" defTabSz="914400" rtl="0" eaLnBrk="1" latinLnBrk="1" hangingPunct="1">
+                <a:defRPr sz="1800" kern="1200">
+                  <a:solidFill>
+                    <a:schemeClr val="lt1"/>
+                  </a:solidFill>
+                  <a:latin typeface="+mn-lt"/>
+                  <a:ea typeface="+mn-ea"/>
+                  <a:cs typeface="+mn-cs"/>
+                </a:defRPr>
+              </a:lvl3pPr>
+              <a:lvl4pPr marL="1371600" algn="l" defTabSz="914400" rtl="0" eaLnBrk="1" latinLnBrk="1" hangingPunct="1">
+                <a:defRPr sz="1800" kern="1200">
+                  <a:solidFill>
+                    <a:schemeClr val="lt1"/>
+                  </a:solidFill>
+                  <a:latin typeface="+mn-lt"/>
+                  <a:ea typeface="+mn-ea"/>
+                  <a:cs typeface="+mn-cs"/>
+                </a:defRPr>
+              </a:lvl4pPr>
+              <a:lvl5pPr marL="1828800" algn="l" defTabSz="914400" rtl="0" eaLnBrk="1" latinLnBrk="1" hangingPunct="1">
+                <a:defRPr sz="1800" kern="1200">
+                  <a:solidFill>
+                    <a:schemeClr val="lt1"/>
+                  </a:solidFill>
+                  <a:latin typeface="+mn-lt"/>
+                  <a:ea typeface="+mn-ea"/>
+                  <a:cs typeface="+mn-cs"/>
+                </a:defRPr>
+              </a:lvl5pPr>
+              <a:lvl6pPr marL="2286000" algn="l" defTabSz="914400" rtl="0" eaLnBrk="1" latinLnBrk="1" hangingPunct="1">
+                <a:defRPr sz="1800" kern="1200">
+                  <a:solidFill>
+                    <a:schemeClr val="lt1"/>
+                  </a:solidFill>
+                  <a:latin typeface="+mn-lt"/>
+                  <a:ea typeface="+mn-ea"/>
+                  <a:cs typeface="+mn-cs"/>
+                </a:defRPr>
+              </a:lvl6pPr>
+              <a:lvl7pPr marL="2743200" algn="l" defTabSz="914400" rtl="0" eaLnBrk="1" latinLnBrk="1" hangingPunct="1">
+                <a:defRPr sz="1800" kern="1200">
+                  <a:solidFill>
+                    <a:schemeClr val="lt1"/>
+                  </a:solidFill>
+                  <a:latin typeface="+mn-lt"/>
+                  <a:ea typeface="+mn-ea"/>
+                  <a:cs typeface="+mn-cs"/>
+                </a:defRPr>
+              </a:lvl7pPr>
+              <a:lvl8pPr marL="3200400" algn="l" defTabSz="914400" rtl="0" eaLnBrk="1" latinLnBrk="1" hangingPunct="1">
+                <a:defRPr sz="1800" kern="1200">
+                  <a:solidFill>
+                    <a:schemeClr val="lt1"/>
+                  </a:solidFill>
+                  <a:latin typeface="+mn-lt"/>
+                  <a:ea typeface="+mn-ea"/>
+                  <a:cs typeface="+mn-cs"/>
+                </a:defRPr>
+              </a:lvl8pPr>
+              <a:lvl9pPr marL="3657600" algn="l" defTabSz="914400" rtl="0" eaLnBrk="1" latinLnBrk="1" hangingPunct="1">
+                <a:defRPr sz="1800" kern="1200">
+                  <a:solidFill>
+                    <a:schemeClr val="lt1"/>
+                  </a:solidFill>
+                  <a:latin typeface="+mn-lt"/>
+                  <a:ea typeface="+mn-ea"/>
+                  <a:cs typeface="+mn-cs"/>
+                </a:defRPr>
+              </a:lvl9pPr>
+            </a:lstStyle>
+            <a:p>
+              <a:pPr algn="ctr"/>
+              <a:endParaRPr lang="ko-KR" altLang="en-US" sz="2000">
+                <a:solidFill>
+                  <a:schemeClr val="bg1"/>
+                </a:solidFill>
+                <a:latin typeface="-윤고딕340" panose="02030504000101010101" pitchFamily="18" charset="-127"/>
+                <a:ea typeface="-윤고딕340" panose="02030504000101010101" pitchFamily="18" charset="-127"/>
+              </a:endParaRPr>
+            </a:p>
+          </p:txBody>
+        </p:sp>
+        <p:cxnSp>
+          <p:nvCxnSpPr>
+            <p:cNvPr id="17" name="직선 연결선 16"/>
+            <p:cNvCxnSpPr/>
+            <p:nvPr/>
+          </p:nvCxnSpPr>
+          <p:spPr>
+            <a:xfrm>
+              <a:off x="0" y="3756786"/>
+              <a:ext cx="9144000" cy="0"/>
+            </a:xfrm>
+            <a:prstGeom prst="line">
+              <a:avLst/>
+            </a:prstGeom>
+            <a:ln w="15875">
+              <a:solidFill>
+                <a:srgbClr val="005094"/>
+              </a:solidFill>
+            </a:ln>
+          </p:spPr>
+          <p:style>
+            <a:lnRef idx="1">
+              <a:schemeClr val="accent1"/>
+            </a:lnRef>
+            <a:fillRef idx="0">
+              <a:schemeClr val="accent1"/>
+            </a:fillRef>
+            <a:effectRef idx="0">
+              <a:schemeClr val="accent1"/>
+            </a:effectRef>
+            <a:fontRef idx="minor">
+              <a:schemeClr val="tx1"/>
+            </a:fontRef>
+          </p:style>
+        </p:cxnSp>
+      </p:grpSp>
+      <p:sp>
+        <p:nvSpPr>
+          <p:cNvPr id="18" name="TextBox 17"/>
+          <p:cNvSpPr txBox="1"/>
+          <p:nvPr/>
+        </p:nvSpPr>
+        <p:spPr>
+          <a:xfrm>
+            <a:off x="299927" y="105444"/>
+            <a:ext cx="8196507" cy="584775"/>
+          </a:xfrm>
+          <a:prstGeom prst="rect">
+            <a:avLst/>
+          </a:prstGeom>
+          <a:noFill/>
+        </p:spPr>
+        <p:txBody>
+          <a:bodyPr wrap="square" rtlCol="0">
+            <a:spAutoFit/>
+          </a:bodyPr>
+          <a:lstStyle/>
+          <a:p>
+            <a:r>
+              <a:rPr lang="ko-KR" altLang="en-US" sz="3200">
+                <a:solidFill>
+                  <a:schemeClr val="tx2"/>
+                </a:solidFill>
+                <a:latin typeface="HY견고딕" panose="02030600000101010101" pitchFamily="18" charset="-127"/>
+                <a:ea typeface="HY견고딕" panose="02030600000101010101" pitchFamily="18" charset="-127"/>
+              </a:rPr>
               <a:t>수행방법 및 기여도</a:t>
             </a:r>
             <a:endParaRPr lang="ko-KR" altLang="en-US" sz="3200" dirty="0">
@@ -6384,7 +7595,7 @@
             </a:endParaRPr>
           </a:p>
           <a:p>
-            <a:pPr marL="342900" indent="-342900">
+            <a:pPr indent="-180000">
               <a:lnSpc>
                 <a:spcPts val="2300"/>
               </a:lnSpc>
@@ -6402,7 +7613,7 @@
             </a:endParaRPr>
           </a:p>
           <a:p>
-            <a:pPr marL="285750" indent="-285750">
+            <a:pPr indent="-180000">
               <a:lnSpc>
                 <a:spcPts val="2300"/>
               </a:lnSpc>
@@ -6410,26 +7621,20 @@
               <a:buChar char="-"/>
             </a:pPr>
             <a:r>
+              <a:rPr lang="ko-KR" altLang="en-US" sz="1600">
+                <a:latin typeface="+mn-ea"/>
+              </a:rPr>
+              <a:t>프로젝트 </a:t>
+            </a:r>
+            <a:r>
               <a:rPr lang="en-US" altLang="ko-KR" sz="1600">
                 <a:latin typeface="+mn-ea"/>
               </a:rPr>
-              <a:t> </a:t>
-            </a:r>
-            <a:r>
-              <a:rPr lang="ko-KR" altLang="en-US" sz="1600">
-                <a:latin typeface="+mn-ea"/>
-              </a:rPr>
-              <a:t>프로젝트 </a:t>
-            </a:r>
-            <a:r>
-              <a:rPr lang="en-US" altLang="ko-KR" sz="1600">
-                <a:latin typeface="+mn-ea"/>
-              </a:rPr>
               <a:t>1</a:t>
             </a:r>
           </a:p>
           <a:p>
-            <a:pPr marL="742950" lvl="1" indent="-285750">
+            <a:pPr marL="457200" lvl="2" indent="-180000">
               <a:lnSpc>
                 <a:spcPts val="2300"/>
               </a:lnSpc>
@@ -6459,7 +7664,7 @@
             </a:endParaRPr>
           </a:p>
           <a:p>
-            <a:pPr marL="285750" indent="-285750">
+            <a:pPr indent="-180000">
               <a:lnSpc>
                 <a:spcPts val="2300"/>
               </a:lnSpc>
@@ -6480,7 +7685,7 @@
             </a:r>
           </a:p>
           <a:p>
-            <a:pPr marL="742950" lvl="1" indent="-285750">
+            <a:pPr marL="457200" lvl="2" indent="-180000">
               <a:lnSpc>
                 <a:spcPts val="2300"/>
               </a:lnSpc>
@@ -10745,141 +11950,6 @@
       </p:sp>
       <p:sp>
         <p:nvSpPr>
-          <p:cNvPr id="9" name="TextBox 8">
-            <a:extLst>
-              <a:ext uri="{FF2B5EF4-FFF2-40B4-BE49-F238E27FC236}">
-                <a16:creationId xmlns:a16="http://schemas.microsoft.com/office/drawing/2014/main" id="{3FA87A73-3FF2-4334-AD42-AEC104EEA300}"/>
-              </a:ext>
-            </a:extLst>
-          </p:cNvPr>
-          <p:cNvSpPr txBox="1"/>
-          <p:nvPr/>
-        </p:nvSpPr>
-        <p:spPr>
-          <a:xfrm>
-            <a:off x="155912" y="944638"/>
-            <a:ext cx="8706254" cy="1243097"/>
-          </a:xfrm>
-          <a:prstGeom prst="rect">
-            <a:avLst/>
-          </a:prstGeom>
-          <a:noFill/>
-        </p:spPr>
-        <p:txBody>
-          <a:bodyPr wrap="square" rtlCol="0">
-            <a:spAutoFit/>
-          </a:bodyPr>
-          <a:lstStyle/>
-          <a:p>
-            <a:pPr>
-              <a:lnSpc>
-                <a:spcPts val="2300"/>
-              </a:lnSpc>
-            </a:pPr>
-            <a:r>
-              <a:rPr lang="en-US" altLang="ko-KR" sz="2000" b="1">
-                <a:latin typeface="+mn-ea"/>
-              </a:rPr>
-              <a:t>Data </a:t>
-            </a:r>
-            <a:r>
-              <a:rPr lang="ko-KR" altLang="en-US" sz="2000" b="1">
-                <a:latin typeface="+mn-ea"/>
-              </a:rPr>
-              <a:t>추가</a:t>
-            </a:r>
-            <a:r>
-              <a:rPr lang="en-US" altLang="ko-KR" sz="2000" b="1">
-                <a:latin typeface="+mn-ea"/>
-              </a:rPr>
-              <a:t>/augmentation</a:t>
-            </a:r>
-          </a:p>
-          <a:p>
-            <a:pPr marL="285750" indent="-285750">
-              <a:lnSpc>
-                <a:spcPts val="2300"/>
-              </a:lnSpc>
-              <a:buFontTx/>
-              <a:buChar char="-"/>
-            </a:pPr>
-            <a:r>
-              <a:rPr lang="ko-KR" altLang="en-US" sz="1600">
-                <a:latin typeface="+mn-ea"/>
-              </a:rPr>
-              <a:t>방법 </a:t>
-            </a:r>
-            <a:r>
-              <a:rPr lang="en-US" altLang="ko-KR" sz="1600">
-                <a:latin typeface="+mn-ea"/>
-              </a:rPr>
-              <a:t>(</a:t>
-            </a:r>
-            <a:r>
-              <a:rPr lang="ko-KR" altLang="en-US" sz="1600">
-                <a:latin typeface="+mn-ea"/>
-              </a:rPr>
-              <a:t>구체적으로 기술</a:t>
-            </a:r>
-            <a:r>
-              <a:rPr lang="en-US" altLang="ko-KR" sz="1600">
-                <a:latin typeface="+mn-ea"/>
-              </a:rPr>
-              <a:t>… </a:t>
-            </a:r>
-            <a:r>
-              <a:rPr lang="ko-KR" altLang="en-US" sz="1600">
-                <a:latin typeface="+mn-ea"/>
-              </a:rPr>
-              <a:t>흐름도 등으로 설명</a:t>
-            </a:r>
-            <a:r>
-              <a:rPr lang="en-US" altLang="ko-KR" sz="1600">
-                <a:latin typeface="+mn-ea"/>
-              </a:rPr>
-              <a:t>)</a:t>
-            </a:r>
-          </a:p>
-          <a:p>
-            <a:pPr marL="285750" indent="-285750">
-              <a:lnSpc>
-                <a:spcPts val="2300"/>
-              </a:lnSpc>
-              <a:buFontTx/>
-              <a:buChar char="-"/>
-            </a:pPr>
-            <a:r>
-              <a:rPr lang="ko-KR" altLang="en-US" sz="1600">
-                <a:latin typeface="+mn-ea"/>
-              </a:rPr>
-              <a:t>수량</a:t>
-            </a:r>
-            <a:endParaRPr lang="en-US" altLang="ko-KR" sz="1600">
-              <a:latin typeface="+mn-ea"/>
-            </a:endParaRPr>
-          </a:p>
-          <a:p>
-            <a:pPr marL="285750" indent="-285750">
-              <a:lnSpc>
-                <a:spcPts val="2300"/>
-              </a:lnSpc>
-              <a:buFontTx/>
-              <a:buChar char="-"/>
-            </a:pPr>
-            <a:r>
-              <a:rPr lang="ko-KR" altLang="en-US" sz="1600">
-                <a:latin typeface="+mn-ea"/>
-              </a:rPr>
-              <a:t>실행결과 영상 예 등</a:t>
-            </a:r>
-            <a:endParaRPr lang="en-US" altLang="ko-KR" sz="1600" dirty="0">
-              <a:latin typeface="+mn-ea"/>
-            </a:endParaRPr>
-          </a:p>
-        </p:txBody>
-      </p:sp>
-      <p:sp>
-        <p:nvSpPr>
           <p:cNvPr id="2" name="Rectangle 2">
             <a:extLst>
               <a:ext uri="{FF2B5EF4-FFF2-40B4-BE49-F238E27FC236}">
@@ -10947,10 +12017,169 @@
           </a:p>
         </p:txBody>
       </p:sp>
+      <p:sp>
+        <p:nvSpPr>
+          <p:cNvPr id="10" name="TextBox 9">
+            <a:extLst>
+              <a:ext uri="{FF2B5EF4-FFF2-40B4-BE49-F238E27FC236}">
+                <a16:creationId xmlns:a16="http://schemas.microsoft.com/office/drawing/2014/main" id="{4E1E0B13-BE7C-F2CD-2510-F8C00CF4A278}"/>
+              </a:ext>
+            </a:extLst>
+          </p:cNvPr>
+          <p:cNvSpPr txBox="1"/>
+          <p:nvPr/>
+        </p:nvSpPr>
+        <p:spPr>
+          <a:xfrm>
+            <a:off x="151123" y="980728"/>
+            <a:ext cx="8706254" cy="1538050"/>
+          </a:xfrm>
+          <a:prstGeom prst="rect">
+            <a:avLst/>
+          </a:prstGeom>
+          <a:noFill/>
+        </p:spPr>
+        <p:txBody>
+          <a:bodyPr wrap="square" rtlCol="0">
+            <a:spAutoFit/>
+          </a:bodyPr>
+          <a:lstStyle/>
+          <a:p>
+            <a:pPr>
+              <a:lnSpc>
+                <a:spcPts val="2300"/>
+              </a:lnSpc>
+            </a:pPr>
+            <a:r>
+              <a:rPr lang="en-US" altLang="ko-KR" sz="2000" b="1">
+                <a:latin typeface="+mn-ea"/>
+              </a:rPr>
+              <a:t>Data </a:t>
+            </a:r>
+            <a:r>
+              <a:rPr lang="ko-KR" altLang="en-US" sz="2000" b="1">
+                <a:latin typeface="+mn-ea"/>
+              </a:rPr>
+              <a:t>추가 및 레이블링</a:t>
+            </a:r>
+            <a:endParaRPr lang="en-US" altLang="ko-KR" sz="2000" b="1">
+              <a:latin typeface="+mn-ea"/>
+            </a:endParaRPr>
+          </a:p>
+          <a:p>
+            <a:pPr marL="0" lvl="1" indent="-180000">
+              <a:lnSpc>
+                <a:spcPts val="2300"/>
+              </a:lnSpc>
+              <a:buFontTx/>
+              <a:buChar char="-"/>
+            </a:pPr>
+            <a:r>
+              <a:rPr lang="en-US" altLang="ko-KR" sz="1600">
+                <a:latin typeface="+mn-ea"/>
+              </a:rPr>
+              <a:t>Roboflow </a:t>
+            </a:r>
+            <a:r>
+              <a:rPr lang="ko-KR" altLang="en-US" sz="1600">
+                <a:latin typeface="+mn-ea"/>
+              </a:rPr>
+              <a:t>활용</a:t>
+            </a:r>
+            <a:endParaRPr lang="en-US" altLang="ko-KR" sz="1600">
+              <a:latin typeface="+mn-ea"/>
+            </a:endParaRPr>
+          </a:p>
+          <a:p>
+            <a:pPr marL="457200" lvl="2" indent="-180000">
+              <a:lnSpc>
+                <a:spcPts val="2300"/>
+              </a:lnSpc>
+              <a:buFontTx/>
+              <a:buChar char="-"/>
+            </a:pPr>
+            <a:r>
+              <a:rPr lang="ko-KR" altLang="en-US" sz="1600">
+                <a:latin typeface="+mn-ea"/>
+              </a:rPr>
+              <a:t>기본 제공 이미지셋에서 잘못 분류되어 있는 데이터 수정</a:t>
+            </a:r>
+            <a:endParaRPr lang="en-US" altLang="ko-KR" sz="1600">
+              <a:latin typeface="+mn-ea"/>
+            </a:endParaRPr>
+          </a:p>
+          <a:p>
+            <a:pPr marL="457200" lvl="2" indent="-180000">
+              <a:lnSpc>
+                <a:spcPts val="2300"/>
+              </a:lnSpc>
+              <a:buFontTx/>
+              <a:buChar char="-"/>
+            </a:pPr>
+            <a:r>
+              <a:rPr lang="ko-KR" altLang="en-US" sz="1600">
+                <a:latin typeface="+mn-ea"/>
+              </a:rPr>
+              <a:t>추가 업로드 데이터에 대해서도 동일 작업 가능</a:t>
+            </a:r>
+            <a:endParaRPr lang="en-US" altLang="ko-KR" sz="1600">
+              <a:latin typeface="+mn-ea"/>
+            </a:endParaRPr>
+          </a:p>
+          <a:p>
+            <a:pPr indent="-180000">
+              <a:lnSpc>
+                <a:spcPts val="2300"/>
+              </a:lnSpc>
+              <a:buFontTx/>
+              <a:buChar char="-"/>
+            </a:pPr>
+            <a:endParaRPr lang="en-US" altLang="ko-KR" sz="1600">
+              <a:latin typeface="+mn-ea"/>
+            </a:endParaRPr>
+          </a:p>
+        </p:txBody>
+      </p:sp>
+      <p:pic>
+        <p:nvPicPr>
+          <p:cNvPr id="6" name="그림 5">
+            <a:extLst>
+              <a:ext uri="{FF2B5EF4-FFF2-40B4-BE49-F238E27FC236}">
+                <a16:creationId xmlns:a16="http://schemas.microsoft.com/office/drawing/2014/main" id="{129784E8-B143-436A-9779-75C6CEC644C3}"/>
+              </a:ext>
+            </a:extLst>
+          </p:cNvPr>
+          <p:cNvPicPr>
+            <a:picLocks noChangeAspect="1"/>
+          </p:cNvPicPr>
+          <p:nvPr/>
+        </p:nvPicPr>
+        <p:blipFill>
+          <a:blip r:embed="rId3">
+            <a:extLst>
+              <a:ext uri="{28A0092B-C50C-407E-A947-70E740481C1C}">
+                <a14:useLocalDpi xmlns:a14="http://schemas.microsoft.com/office/drawing/2010/main" val="0"/>
+              </a:ext>
+            </a:extLst>
+          </a:blip>
+          <a:stretch>
+            <a:fillRect/>
+          </a:stretch>
+        </p:blipFill>
+        <p:spPr>
+          <a:xfrm>
+            <a:off x="521796" y="2346397"/>
+            <a:ext cx="8172400" cy="4294767"/>
+          </a:xfrm>
+          <a:prstGeom prst="rect">
+            <a:avLst/>
+          </a:prstGeom>
+        </p:spPr>
+      </p:pic>
     </p:spTree>
     <p:extLst>
       <p:ext uri="{BB962C8B-B14F-4D97-AF65-F5344CB8AC3E}">
-        <p14:creationId xmlns:p14="http://schemas.microsoft.com/office/powerpoint/2010/main" val="2371836103"/>
+        <p14:creationId xmlns:p14="http://schemas.microsoft.com/office/powerpoint/2010/main" val="508676076"/>
       </p:ext>
     </p:extLst>
   </p:cSld>
@@ -11369,7 +12598,7 @@
               <a:rPr lang="ko-KR" altLang="en-US" sz="2000" b="1">
                 <a:latin typeface="+mn-ea"/>
               </a:rPr>
-              <a:t>레이블링</a:t>
+              <a:t>추가 및 레이블링</a:t>
             </a:r>
             <a:endParaRPr lang="en-US" altLang="ko-KR" sz="2000" b="1">
               <a:latin typeface="+mn-ea"/>
@@ -11384,44 +12613,35 @@
               <a:buChar char="-"/>
             </a:pPr>
             <a:r>
+              <a:rPr lang="en-US" altLang="ko-KR" sz="1600">
+                <a:latin typeface="+mn-ea"/>
+              </a:rPr>
+              <a:t>LabelImg</a:t>
+            </a:r>
+            <a:r>
               <a:rPr lang="ko-KR" altLang="en-US" sz="1600">
                 <a:latin typeface="+mn-ea"/>
               </a:rPr>
-              <a:t>방법 </a:t>
+              <a:t> </a:t>
             </a:r>
             <a:r>
               <a:rPr lang="en-US" altLang="ko-KR" sz="1600">
                 <a:latin typeface="+mn-ea"/>
               </a:rPr>
-              <a:t>(</a:t>
+              <a:t>tool</a:t>
             </a:r>
             <a:r>
               <a:rPr lang="ko-KR" altLang="en-US" sz="1600">
                 <a:latin typeface="+mn-ea"/>
               </a:rPr>
-              <a:t>구체적으로 기술</a:t>
-            </a:r>
-            <a:r>
-              <a:rPr lang="en-US" altLang="ko-KR" sz="1600">
-                <a:latin typeface="+mn-ea"/>
-              </a:rPr>
-              <a:t>… </a:t>
-            </a:r>
-            <a:r>
-              <a:rPr lang="ko-KR" altLang="en-US" sz="1600">
-                <a:latin typeface="+mn-ea"/>
-              </a:rPr>
-              <a:t>흐름도 등으로 설명</a:t>
-            </a:r>
-            <a:r>
-              <a:rPr lang="en-US" altLang="ko-KR" sz="1600">
-                <a:latin typeface="+mn-ea"/>
-              </a:rPr>
-              <a:t>)</a:t>
-            </a:r>
-          </a:p>
-          <a:p>
-            <a:pPr marL="285750" indent="-285750">
+              <a:t> 활용</a:t>
+            </a:r>
+            <a:endParaRPr lang="en-US" altLang="ko-KR" sz="1600">
+              <a:latin typeface="+mn-ea"/>
+            </a:endParaRPr>
+          </a:p>
+          <a:p>
+            <a:pPr marL="742950" lvl="1" indent="-285750">
               <a:lnSpc>
                 <a:spcPts val="2300"/>
               </a:lnSpc>
@@ -11429,17 +12649,23 @@
               <a:buChar char="-"/>
             </a:pPr>
             <a:r>
+              <a:rPr lang="en-US" altLang="ko-KR" sz="1600">
+                <a:latin typeface="+mn-ea"/>
+              </a:rPr>
+              <a:t>Unsplash </a:t>
+            </a:r>
+            <a:r>
               <a:rPr lang="ko-KR" altLang="en-US" sz="1600">
                 <a:latin typeface="+mn-ea"/>
               </a:rPr>
-              <a:t>수량</a:t>
+              <a:t>무료 이미지 활용</a:t>
             </a:r>
             <a:endParaRPr lang="en-US" altLang="ko-KR" sz="1600">
               <a:latin typeface="+mn-ea"/>
             </a:endParaRPr>
           </a:p>
           <a:p>
-            <a:pPr marL="285750" indent="-285750">
+            <a:pPr marL="742950" lvl="1" indent="-285750">
               <a:lnSpc>
                 <a:spcPts val="2300"/>
               </a:lnSpc>
@@ -11450,14 +12676,62 @@
               <a:rPr lang="ko-KR" altLang="en-US" sz="1600">
                 <a:latin typeface="+mn-ea"/>
               </a:rPr>
-              <a:t>실행결과 영상 예 등</a:t>
-            </a:r>
-            <a:endParaRPr lang="en-US" altLang="ko-KR" sz="1600" dirty="0">
+              <a:t>상대적으로 부족한 </a:t>
+            </a:r>
+            <a:r>
+              <a:rPr lang="en-US" altLang="ko-KR" sz="1600">
+                <a:latin typeface="+mn-ea"/>
+              </a:rPr>
+              <a:t>head image</a:t>
+            </a:r>
+            <a:r>
+              <a:rPr lang="ko-KR" altLang="en-US" sz="1600">
+                <a:latin typeface="+mn-ea"/>
+              </a:rPr>
+              <a:t>에 대한 데이터 추가</a:t>
+            </a:r>
+            <a:endParaRPr lang="en-US" altLang="ko-KR" sz="1600">
               <a:latin typeface="+mn-ea"/>
             </a:endParaRPr>
           </a:p>
         </p:txBody>
       </p:sp>
+      <p:pic>
+        <p:nvPicPr>
+          <p:cNvPr id="4" name="그림 3">
+            <a:extLst>
+              <a:ext uri="{FF2B5EF4-FFF2-40B4-BE49-F238E27FC236}">
+                <a16:creationId xmlns:a16="http://schemas.microsoft.com/office/drawing/2014/main" id="{F5A39E6E-E64D-4B10-8074-5B811998C703}"/>
+              </a:ext>
+            </a:extLst>
+          </p:cNvPr>
+          <p:cNvPicPr>
+            <a:picLocks noChangeAspect="1"/>
+          </p:cNvPicPr>
+          <p:nvPr/>
+        </p:nvPicPr>
+        <p:blipFill>
+          <a:blip r:embed="rId3" cstate="print">
+            <a:extLst>
+              <a:ext uri="{28A0092B-C50C-407E-A947-70E740481C1C}">
+                <a14:useLocalDpi xmlns:a14="http://schemas.microsoft.com/office/drawing/2010/main" val="0"/>
+              </a:ext>
+            </a:extLst>
+          </a:blip>
+          <a:stretch>
+            <a:fillRect/>
+          </a:stretch>
+        </p:blipFill>
+        <p:spPr>
+          <a:xfrm>
+            <a:off x="683568" y="2414030"/>
+            <a:ext cx="7508986" cy="3632492"/>
+          </a:xfrm>
+          <a:prstGeom prst="rect">
+            <a:avLst/>
+          </a:prstGeom>
+        </p:spPr>
+      </p:pic>
     </p:spTree>
     <p:extLst>
       <p:ext uri="{BB962C8B-B14F-4D97-AF65-F5344CB8AC3E}">
@@ -11756,7 +13030,7 @@
                 <a:latin typeface="HY견고딕" panose="02030600000101010101" pitchFamily="18" charset="-127"/>
                 <a:ea typeface="HY견고딕" panose="02030600000101010101" pitchFamily="18" charset="-127"/>
               </a:rPr>
-              <a:t>모델 학습</a:t>
+              <a:t>데이터셋 구성</a:t>
             </a:r>
             <a:endParaRPr lang="ko-KR" altLang="en-US" sz="3200" dirty="0">
               <a:solidFill>
@@ -11783,7 +13057,7 @@
         <p:spPr>
           <a:xfrm>
             <a:off x="155912" y="944638"/>
-            <a:ext cx="8706254" cy="3012812"/>
+            <a:ext cx="8706254" cy="948145"/>
           </a:xfrm>
           <a:prstGeom prst="rect">
             <a:avLst/>
@@ -11802,275 +13076,121 @@
               </a:lnSpc>
             </a:pPr>
             <a:r>
-              <a:rPr lang="ko-KR" altLang="en-US" sz="2000" b="1">
+              <a:rPr lang="en-US" altLang="ko-KR" sz="2000" b="1">
                 <a:latin typeface="+mn-ea"/>
               </a:rPr>
-              <a:t>딥러닝 학습 환경</a:t>
-            </a:r>
-            <a:endParaRPr lang="en-US" altLang="ko-KR" sz="2000" b="1" dirty="0">
-              <a:latin typeface="+mn-ea"/>
-            </a:endParaRPr>
-          </a:p>
-          <a:p>
-            <a:pPr>
+              <a:t>Data Augmentation</a:t>
+            </a:r>
+          </a:p>
+          <a:p>
+            <a:pPr marL="285750" indent="-285750">
               <a:lnSpc>
                 <a:spcPts val="2300"/>
               </a:lnSpc>
+              <a:buFontTx/>
+              <a:buChar char="-"/>
             </a:pPr>
-            <a:r>
-              <a:rPr lang="en-US" altLang="ko-KR" sz="1600" dirty="0">
-                <a:latin typeface="+mn-ea"/>
-              </a:rPr>
-              <a:t>  </a:t>
-            </a:r>
             <a:r>
               <a:rPr lang="en-US" altLang="ko-KR" sz="1600">
                 <a:latin typeface="+mn-ea"/>
               </a:rPr>
-              <a:t>- (HW) PC </a:t>
+              <a:t>Roboflow</a:t>
             </a:r>
             <a:r>
               <a:rPr lang="ko-KR" altLang="en-US" sz="1600">
                 <a:latin typeface="+mn-ea"/>
               </a:rPr>
-              <a:t>사양</a:t>
+              <a:t> </a:t>
             </a:r>
             <a:r>
               <a:rPr lang="en-US" altLang="ko-KR" sz="1600">
                 <a:latin typeface="+mn-ea"/>
               </a:rPr>
-              <a:t>, </a:t>
+              <a:t>Tool </a:t>
             </a:r>
             <a:r>
               <a:rPr lang="ko-KR" altLang="en-US" sz="1600">
                 <a:latin typeface="+mn-ea"/>
               </a:rPr>
-              <a:t>학습시간</a:t>
-            </a:r>
-            <a:br>
-              <a:rPr lang="en-US" altLang="ko-KR" sz="1600">
-                <a:latin typeface="+mn-ea"/>
-              </a:rPr>
-            </a:br>
-            <a:r>
-              <a:rPr lang="en-US" altLang="ko-KR" sz="1600">
-                <a:latin typeface="+mn-ea"/>
-              </a:rPr>
-              <a:t> 	</a:t>
-            </a:r>
-            <a:r>
-              <a:rPr lang="en-US" altLang="ko-KR" sz="1600" kern="0" spc="-50">
-                <a:latin typeface="맑은 고딕" panose="020B0503020000020004" pitchFamily="50" charset="-127"/>
-                <a:ea typeface="맑은 고딕" panose="020B0503020000020004" pitchFamily="50" charset="-127"/>
-              </a:rPr>
-              <a:t>CPU : </a:t>
-            </a:r>
-            <a:r>
-              <a:rPr lang="pt-BR" altLang="ko-KR" sz="1600" kern="0" spc="-50">
-                <a:latin typeface="맑은 고딕" panose="020B0503020000020004" pitchFamily="50" charset="-127"/>
-                <a:ea typeface="맑은 고딕" panose="020B0503020000020004" pitchFamily="50" charset="-127"/>
-              </a:rPr>
-              <a:t>Intel Xeon CPU E5-2696 v5 @ 4.40GHz</a:t>
-            </a:r>
-            <a:br>
-              <a:rPr lang="pt-BR" altLang="ko-KR" sz="1600" kern="0" spc="-50">
-                <a:latin typeface="맑은 고딕" panose="020B0503020000020004" pitchFamily="50" charset="-127"/>
-                <a:ea typeface="맑은 고딕" panose="020B0503020000020004" pitchFamily="50" charset="-127"/>
-              </a:rPr>
-            </a:br>
-            <a:r>
-              <a:rPr lang="pt-BR" altLang="ko-KR" sz="1600" kern="0" spc="-50">
-                <a:latin typeface="맑은 고딕" panose="020B0503020000020004" pitchFamily="50" charset="-127"/>
-                <a:ea typeface="맑은 고딕" panose="020B0503020000020004" pitchFamily="50" charset="-127"/>
-              </a:rPr>
-              <a:t>	RAM : 512GB</a:t>
-            </a:r>
-            <a:br>
-              <a:rPr lang="pt-BR" altLang="ko-KR" sz="1600" kern="0" spc="-50">
-                <a:latin typeface="맑은 고딕" panose="020B0503020000020004" pitchFamily="50" charset="-127"/>
-                <a:ea typeface="맑은 고딕" panose="020B0503020000020004" pitchFamily="50" charset="-127"/>
-              </a:rPr>
-            </a:br>
-            <a:r>
-              <a:rPr lang="pt-BR" altLang="ko-KR" sz="1600" kern="0" spc="-50">
-                <a:latin typeface="맑은 고딕" panose="020B0503020000020004" pitchFamily="50" charset="-127"/>
-                <a:ea typeface="맑은 고딕" panose="020B0503020000020004" pitchFamily="50" charset="-127"/>
-              </a:rPr>
-              <a:t>	GPU : </a:t>
-            </a:r>
-            <a:r>
-              <a:rPr lang="en-US" altLang="ko-KR" sz="1600" kern="0" spc="-50">
-                <a:latin typeface="맑은 고딕" panose="020B0503020000020004" pitchFamily="50" charset="-127"/>
-                <a:ea typeface="맑은 고딕" panose="020B0503020000020004" pitchFamily="50" charset="-127"/>
-              </a:rPr>
-              <a:t>NVIDIA GeForce GTX 1080 24GB</a:t>
-            </a:r>
-            <a:br>
-              <a:rPr lang="en-US" altLang="ko-KR" sz="1600">
-                <a:latin typeface="+mn-ea"/>
-              </a:rPr>
-            </a:br>
-            <a:r>
-              <a:rPr lang="en-US" altLang="ko-KR" sz="1600">
-                <a:latin typeface="+mn-ea"/>
-              </a:rPr>
-              <a:t>  - (SW) Pytorch, CUDA… </a:t>
-            </a:r>
-            <a:br>
-              <a:rPr lang="en-US" altLang="ko-KR" sz="1600">
-                <a:latin typeface="+mn-ea"/>
-              </a:rPr>
-            </a:br>
-            <a:r>
-              <a:rPr lang="en-US" altLang="ko-KR" sz="1600">
-                <a:latin typeface="+mn-ea"/>
-              </a:rPr>
-              <a:t>  - </a:t>
-            </a:r>
-            <a:r>
-              <a:rPr lang="ko-KR" altLang="en-US" sz="1600">
-                <a:latin typeface="+mn-ea"/>
-              </a:rPr>
-              <a:t>하이퍼파라미터 </a:t>
-            </a:r>
-            <a:r>
-              <a:rPr lang="en-US" altLang="ko-KR" sz="1600">
-                <a:latin typeface="+mn-ea"/>
-              </a:rPr>
-              <a:t>: epoch</a:t>
-            </a:r>
-            <a:r>
-              <a:rPr lang="ko-KR" altLang="en-US" sz="1600">
-                <a:latin typeface="+mn-ea"/>
-              </a:rPr>
-              <a:t>수</a:t>
-            </a:r>
-            <a:r>
-              <a:rPr lang="en-US" altLang="ko-KR" sz="1600">
-                <a:latin typeface="+mn-ea"/>
-              </a:rPr>
-              <a:t>, </a:t>
-            </a:r>
-            <a:r>
-              <a:rPr lang="ko-KR" altLang="en-US" sz="1600">
-                <a:latin typeface="+mn-ea"/>
-              </a:rPr>
-              <a:t>학습률</a:t>
-            </a:r>
-            <a:r>
-              <a:rPr lang="en-US" altLang="ko-KR" sz="1600">
-                <a:latin typeface="+mn-ea"/>
-              </a:rPr>
-              <a:t>, batch size, optimizer, loss </a:t>
-            </a:r>
-            <a:r>
-              <a:rPr lang="ko-KR" altLang="en-US" sz="1600">
-                <a:latin typeface="+mn-ea"/>
-              </a:rPr>
-              <a:t>함수 등</a:t>
-            </a:r>
-            <a:br>
-              <a:rPr lang="en-US" altLang="ko-KR" sz="1600">
-                <a:latin typeface="+mn-ea"/>
-              </a:rPr>
-            </a:br>
-            <a:r>
-              <a:rPr lang="en-US" altLang="ko-KR" sz="1600">
-                <a:latin typeface="+mn-ea"/>
-              </a:rPr>
-              <a:t>  - </a:t>
-            </a:r>
-            <a:r>
-              <a:rPr lang="ko-KR" altLang="en-US" sz="1600">
-                <a:latin typeface="+mn-ea"/>
-              </a:rPr>
-              <a:t>학습추이 그래프 등</a:t>
-            </a:r>
-            <a:endParaRPr lang="en-US" altLang="ko-KR" sz="1600" dirty="0">
+              <a:t>활용</a:t>
+            </a:r>
+            <a:endParaRPr lang="en-US" altLang="ko-KR" sz="1600">
               <a:latin typeface="+mn-ea"/>
             </a:endParaRPr>
           </a:p>
           <a:p>
-            <a:pPr>
+            <a:pPr marL="742950" lvl="1" indent="-285750">
               <a:lnSpc>
                 <a:spcPts val="2300"/>
               </a:lnSpc>
+              <a:buFontTx/>
+              <a:buChar char="-"/>
             </a:pPr>
-            <a:r>
-              <a:rPr lang="en-US" altLang="ko-KR" sz="1600" dirty="0">
-                <a:latin typeface="+mn-ea"/>
-              </a:rPr>
-              <a:t>  </a:t>
-            </a:r>
             <a:r>
               <a:rPr lang="en-US" altLang="ko-KR" sz="1600">
                 <a:latin typeface="+mn-ea"/>
               </a:rPr>
-              <a:t>- </a:t>
+              <a:t>Flip,</a:t>
             </a:r>
             <a:r>
               <a:rPr lang="ko-KR" altLang="en-US" sz="1600">
                 <a:latin typeface="+mn-ea"/>
               </a:rPr>
-              <a:t>학습 중 알게 된 내용 등 </a:t>
+              <a:t> </a:t>
             </a:r>
             <a:r>
               <a:rPr lang="en-US" altLang="ko-KR" sz="1600">
                 <a:latin typeface="+mn-ea"/>
               </a:rPr>
-              <a:t>… </a:t>
+              <a:t>GrayScale,</a:t>
             </a:r>
             <a:r>
               <a:rPr lang="ko-KR" altLang="en-US" sz="1600">
                 <a:latin typeface="+mn-ea"/>
               </a:rPr>
-              <a:t>학습률</a:t>
+              <a:t> </a:t>
             </a:r>
             <a:r>
               <a:rPr lang="en-US" altLang="ko-KR" sz="1600">
                 <a:latin typeface="+mn-ea"/>
               </a:rPr>
-              <a:t>/optimzer</a:t>
+              <a:t>90</a:t>
             </a:r>
             <a:r>
               <a:rPr lang="ko-KR" altLang="en-US" sz="1600">
                 <a:latin typeface="+mn-ea"/>
               </a:rPr>
-              <a:t>에 따른 학습추이 비교 등</a:t>
+              <a:t>도 </a:t>
             </a:r>
             <a:r>
               <a:rPr lang="en-US" altLang="ko-KR" sz="1600">
                 <a:latin typeface="+mn-ea"/>
               </a:rPr>
-              <a:t>…</a:t>
-            </a:r>
-            <a:endParaRPr lang="en-US" altLang="ko-KR" sz="1600" dirty="0">
+              <a:t>rotation </a:t>
+            </a:r>
+            <a:r>
+              <a:rPr lang="ko-KR" altLang="en-US" sz="1600">
+                <a:latin typeface="+mn-ea"/>
+              </a:rPr>
+              <a:t>적용</a:t>
+            </a:r>
+            <a:endParaRPr lang="en-US" altLang="ko-KR" sz="1600">
               <a:latin typeface="+mn-ea"/>
             </a:endParaRPr>
           </a:p>
-          <a:p>
-            <a:pPr>
-              <a:lnSpc>
-                <a:spcPts val="2300"/>
-              </a:lnSpc>
-            </a:pPr>
-            <a:endParaRPr lang="en-US" altLang="ko-KR" sz="1600" dirty="0">
-              <a:latin typeface="+mn-ea"/>
-            </a:endParaRPr>
-          </a:p>
         </p:txBody>
       </p:sp>
       <p:pic>
         <p:nvPicPr>
-          <p:cNvPr id="10" name="_x849392696">
+          <p:cNvPr id="4" name="그림 3">
             <a:extLst>
               <a:ext uri="{FF2B5EF4-FFF2-40B4-BE49-F238E27FC236}">
-                <a16:creationId xmlns:a16="http://schemas.microsoft.com/office/drawing/2014/main" id="{09724804-D02A-417D-BB69-8D0E466DB527}"/>
+                <a16:creationId xmlns:a16="http://schemas.microsoft.com/office/drawing/2014/main" id="{4C7EDCB0-DB98-4066-AD4B-6A6378973EDE}"/>
               </a:ext>
             </a:extLst>
           </p:cNvPr>
           <p:cNvPicPr>
-            <a:picLocks noChangeAspect="1" noChangeArrowheads="1"/>
+            <a:picLocks noChangeAspect="1"/>
           </p:cNvPicPr>
           <p:nvPr/>
         </p:nvPicPr>
@@ -12082,78 +13202,275 @@
               </a:ext>
             </a:extLst>
           </a:blip>
-          <a:srcRect l="7609" r="50313" b="58843"/>
+          <a:srcRect l="26107" t="-1" r="14181" b="-836"/>
           <a:stretch/>
         </p:blipFill>
-        <p:spPr bwMode="auto">
+        <p:spPr>
           <a:xfrm>
-            <a:off x="683568" y="4038718"/>
-            <a:ext cx="3312368" cy="2057635"/>
+            <a:off x="395536" y="2075773"/>
+            <a:ext cx="5024902" cy="4176464"/>
           </a:xfrm>
           <a:prstGeom prst="rect">
             <a:avLst/>
           </a:prstGeom>
-          <a:noFill/>
-          <a:extLst>
-            <a:ext uri="{909E8E84-426E-40DD-AFC4-6F175D3DCCD1}">
-              <a14:hiddenFill xmlns:a14="http://schemas.microsoft.com/office/drawing/2010/main">
-                <a:solidFill>
-                  <a:srgbClr val="FFFFFF"/>
-                </a:solidFill>
-              </a14:hiddenFill>
-            </a:ext>
-          </a:extLst>
         </p:spPr>
       </p:pic>
       <p:pic>
         <p:nvPicPr>
-          <p:cNvPr id="11" name="_x849392696">
+          <p:cNvPr id="7" name="그림 6">
             <a:extLst>
               <a:ext uri="{FF2B5EF4-FFF2-40B4-BE49-F238E27FC236}">
-                <a16:creationId xmlns:a16="http://schemas.microsoft.com/office/drawing/2014/main" id="{65CD0D45-6955-4645-9D14-7B825BEC6813}"/>
+                <a16:creationId xmlns:a16="http://schemas.microsoft.com/office/drawing/2014/main" id="{915A857C-4073-494E-9727-90DF791C070E}"/>
               </a:ext>
             </a:extLst>
           </p:cNvPr>
           <p:cNvPicPr>
-            <a:picLocks noChangeAspect="1" noChangeArrowheads="1"/>
+            <a:picLocks noChangeAspect="1"/>
           </p:cNvPicPr>
           <p:nvPr/>
         </p:nvPicPr>
-        <p:blipFill rotWithShape="1">
-          <a:blip r:embed="rId3">
+        <p:blipFill>
+          <a:blip r:embed="rId4">
             <a:extLst>
               <a:ext uri="{28A0092B-C50C-407E-A947-70E740481C1C}">
                 <a14:useLocalDpi xmlns:a14="http://schemas.microsoft.com/office/drawing/2010/main" val="0"/>
               </a:ext>
             </a:extLst>
           </a:blip>
-          <a:srcRect l="7609" t="46090" r="50313" b="7342"/>
-          <a:stretch/>
+          <a:stretch>
+            <a:fillRect/>
+          </a:stretch>
         </p:blipFill>
-        <p:spPr bwMode="auto">
+        <p:spPr>
           <a:xfrm>
-            <a:off x="4644008" y="4005064"/>
-            <a:ext cx="3312368" cy="2328193"/>
+            <a:off x="4644008" y="2075773"/>
+            <a:ext cx="4308813" cy="4176461"/>
+          </a:xfrm>
+          <a:prstGeom prst="rect">
+            <a:avLst/>
+          </a:prstGeom>
+        </p:spPr>
+      </p:pic>
+      <p:sp>
+        <p:nvSpPr>
+          <p:cNvPr id="8" name="직사각형 7">
+            <a:extLst>
+              <a:ext uri="{FF2B5EF4-FFF2-40B4-BE49-F238E27FC236}">
+                <a16:creationId xmlns:a16="http://schemas.microsoft.com/office/drawing/2014/main" id="{6D3A5969-0379-4C8B-830A-7FAFBABA57BB}"/>
+              </a:ext>
+            </a:extLst>
+          </p:cNvPr>
+          <p:cNvSpPr/>
+          <p:nvPr/>
+        </p:nvSpPr>
+        <p:spPr>
+          <a:xfrm>
+            <a:off x="1692275" y="4531885"/>
+            <a:ext cx="2735709" cy="1129363"/>
           </a:xfrm>
           <a:prstGeom prst="rect">
             <a:avLst/>
           </a:prstGeom>
           <a:noFill/>
-          <a:extLst>
-            <a:ext uri="{909E8E84-426E-40DD-AFC4-6F175D3DCCD1}">
-              <a14:hiddenFill xmlns:a14="http://schemas.microsoft.com/office/drawing/2010/main">
-                <a:solidFill>
-                  <a:srgbClr val="FFFFFF"/>
-                </a:solidFill>
-              </a14:hiddenFill>
-            </a:ext>
-          </a:extLst>
+          <a:ln w="57150" cap="flat" cmpd="sng" algn="ctr">
+            <a:solidFill>
+              <a:schemeClr val="accent2"/>
+            </a:solidFill>
+            <a:prstDash val="solid"/>
+            <a:round/>
+            <a:headEnd type="none" w="med" len="med"/>
+            <a:tailEnd type="none" w="med" len="med"/>
+          </a:ln>
         </p:spPr>
-      </p:pic>
+        <p:style>
+          <a:lnRef idx="0">
+            <a:scrgbClr r="0" g="0" b="0"/>
+          </a:lnRef>
+          <a:fillRef idx="0">
+            <a:scrgbClr r="0" g="0" b="0"/>
+          </a:fillRef>
+          <a:effectRef idx="0">
+            <a:scrgbClr r="0" g="0" b="0"/>
+          </a:effectRef>
+          <a:fontRef idx="minor">
+            <a:schemeClr val="accent2"/>
+          </a:fontRef>
+        </p:style>
+        <p:txBody>
+          <a:bodyPr rtlCol="0" anchor="ctr"/>
+          <a:lstStyle/>
+          <a:p>
+            <a:pPr algn="ctr"/>
+            <a:endParaRPr lang="ko-KR" altLang="en-US"/>
+          </a:p>
+        </p:txBody>
+      </p:sp>
+      <p:sp>
+        <p:nvSpPr>
+          <p:cNvPr id="14" name="직사각형 13">
+            <a:extLst>
+              <a:ext uri="{FF2B5EF4-FFF2-40B4-BE49-F238E27FC236}">
+                <a16:creationId xmlns:a16="http://schemas.microsoft.com/office/drawing/2014/main" id="{7D3B8A95-CCD8-4239-9545-7117117A9795}"/>
+              </a:ext>
+            </a:extLst>
+          </p:cNvPr>
+          <p:cNvSpPr/>
+          <p:nvPr/>
+        </p:nvSpPr>
+        <p:spPr>
+          <a:xfrm>
+            <a:off x="5708470" y="2780928"/>
+            <a:ext cx="447706" cy="544814"/>
+          </a:xfrm>
+          <a:prstGeom prst="rect">
+            <a:avLst/>
+          </a:prstGeom>
+          <a:noFill/>
+          <a:ln w="28575" cap="flat" cmpd="sng" algn="ctr">
+            <a:solidFill>
+              <a:schemeClr val="accent2"/>
+            </a:solidFill>
+            <a:prstDash val="solid"/>
+            <a:round/>
+            <a:headEnd type="none" w="med" len="med"/>
+            <a:tailEnd type="none" w="med" len="med"/>
+          </a:ln>
+        </p:spPr>
+        <p:style>
+          <a:lnRef idx="0">
+            <a:scrgbClr r="0" g="0" b="0"/>
+          </a:lnRef>
+          <a:fillRef idx="0">
+            <a:scrgbClr r="0" g="0" b="0"/>
+          </a:fillRef>
+          <a:effectRef idx="0">
+            <a:scrgbClr r="0" g="0" b="0"/>
+          </a:effectRef>
+          <a:fontRef idx="minor">
+            <a:schemeClr val="accent2"/>
+          </a:fontRef>
+        </p:style>
+        <p:txBody>
+          <a:bodyPr rtlCol="0" anchor="ctr"/>
+          <a:lstStyle/>
+          <a:p>
+            <a:pPr algn="ctr"/>
+            <a:endParaRPr lang="ko-KR" altLang="en-US"/>
+          </a:p>
+        </p:txBody>
+      </p:sp>
+      <p:sp>
+        <p:nvSpPr>
+          <p:cNvPr id="19" name="직사각형 18">
+            <a:extLst>
+              <a:ext uri="{FF2B5EF4-FFF2-40B4-BE49-F238E27FC236}">
+                <a16:creationId xmlns:a16="http://schemas.microsoft.com/office/drawing/2014/main" id="{7CFC3D29-4A98-41E0-BFED-72D9997B2F0A}"/>
+              </a:ext>
+            </a:extLst>
+          </p:cNvPr>
+          <p:cNvSpPr/>
+          <p:nvPr/>
+        </p:nvSpPr>
+        <p:spPr>
+          <a:xfrm>
+            <a:off x="5708469" y="3342067"/>
+            <a:ext cx="447706" cy="544814"/>
+          </a:xfrm>
+          <a:prstGeom prst="rect">
+            <a:avLst/>
+          </a:prstGeom>
+          <a:noFill/>
+          <a:ln w="28575" cap="flat" cmpd="sng" algn="ctr">
+            <a:solidFill>
+              <a:schemeClr val="accent2"/>
+            </a:solidFill>
+            <a:prstDash val="solid"/>
+            <a:round/>
+            <a:headEnd type="none" w="med" len="med"/>
+            <a:tailEnd type="none" w="med" len="med"/>
+          </a:ln>
+        </p:spPr>
+        <p:style>
+          <a:lnRef idx="0">
+            <a:scrgbClr r="0" g="0" b="0"/>
+          </a:lnRef>
+          <a:fillRef idx="0">
+            <a:scrgbClr r="0" g="0" b="0"/>
+          </a:fillRef>
+          <a:effectRef idx="0">
+            <a:scrgbClr r="0" g="0" b="0"/>
+          </a:effectRef>
+          <a:fontRef idx="minor">
+            <a:schemeClr val="accent2"/>
+          </a:fontRef>
+        </p:style>
+        <p:txBody>
+          <a:bodyPr rtlCol="0" anchor="ctr"/>
+          <a:lstStyle/>
+          <a:p>
+            <a:pPr algn="ctr"/>
+            <a:endParaRPr lang="ko-KR" altLang="en-US"/>
+          </a:p>
+        </p:txBody>
+      </p:sp>
+      <p:sp>
+        <p:nvSpPr>
+          <p:cNvPr id="20" name="직사각형 19">
+            <a:extLst>
+              <a:ext uri="{FF2B5EF4-FFF2-40B4-BE49-F238E27FC236}">
+                <a16:creationId xmlns:a16="http://schemas.microsoft.com/office/drawing/2014/main" id="{2E48D764-C924-45A6-9D89-21BE3224CA1F}"/>
+              </a:ext>
+            </a:extLst>
+          </p:cNvPr>
+          <p:cNvSpPr/>
+          <p:nvPr/>
+        </p:nvSpPr>
+        <p:spPr>
+          <a:xfrm>
+            <a:off x="6212526" y="2780928"/>
+            <a:ext cx="447706" cy="544814"/>
+          </a:xfrm>
+          <a:prstGeom prst="rect">
+            <a:avLst/>
+          </a:prstGeom>
+          <a:noFill/>
+          <a:ln w="28575" cap="flat" cmpd="sng" algn="ctr">
+            <a:solidFill>
+              <a:schemeClr val="accent2"/>
+            </a:solidFill>
+            <a:prstDash val="solid"/>
+            <a:round/>
+            <a:headEnd type="none" w="med" len="med"/>
+            <a:tailEnd type="none" w="med" len="med"/>
+          </a:ln>
+        </p:spPr>
+        <p:style>
+          <a:lnRef idx="0">
+            <a:scrgbClr r="0" g="0" b="0"/>
+          </a:lnRef>
+          <a:fillRef idx="0">
+            <a:scrgbClr r="0" g="0" b="0"/>
+          </a:fillRef>
+          <a:effectRef idx="0">
+            <a:scrgbClr r="0" g="0" b="0"/>
+          </a:effectRef>
+          <a:fontRef idx="minor">
+            <a:schemeClr val="accent2"/>
+          </a:fontRef>
+        </p:style>
+        <p:txBody>
+          <a:bodyPr rtlCol="0" anchor="ctr"/>
+          <a:lstStyle/>
+          <a:p>
+            <a:pPr algn="ctr"/>
+            <a:endParaRPr lang="ko-KR" altLang="en-US"/>
+          </a:p>
+        </p:txBody>
+      </p:sp>
     </p:spTree>
     <p:extLst>
       <p:ext uri="{BB962C8B-B14F-4D97-AF65-F5344CB8AC3E}">
-        <p14:creationId xmlns:p14="http://schemas.microsoft.com/office/powerpoint/2010/main" val="2451453977"/>
+        <p14:creationId xmlns:p14="http://schemas.microsoft.com/office/powerpoint/2010/main" val="2371836103"/>
       </p:ext>
     </p:extLst>
   </p:cSld>
@@ -12426,7 +13743,7 @@
         </p:nvSpPr>
         <p:spPr>
           <a:xfrm>
-            <a:off x="176544" y="85377"/>
+            <a:off x="299927" y="105444"/>
             <a:ext cx="8196507" cy="584775"/>
           </a:xfrm>
           <a:prstGeom prst="rect">
@@ -12448,7 +13765,7 @@
                 <a:latin typeface="HY견고딕" panose="02030600000101010101" pitchFamily="18" charset="-127"/>
                 <a:ea typeface="HY견고딕" panose="02030600000101010101" pitchFamily="18" charset="-127"/>
               </a:rPr>
-              <a:t>모델 학습 </a:t>
+              <a:t>모델 학습</a:t>
             </a:r>
             <a:endParaRPr lang="ko-KR" altLang="en-US" sz="3200" dirty="0">
               <a:solidFill>
@@ -12475,7 +13792,7 @@
         <p:spPr>
           <a:xfrm>
             <a:off x="155912" y="944638"/>
-            <a:ext cx="8706254" cy="1243097"/>
+            <a:ext cx="8706254" cy="3012812"/>
           </a:xfrm>
           <a:prstGeom prst="rect">
             <a:avLst/>
@@ -12497,81 +13814,469 @@
               <a:rPr lang="ko-KR" altLang="en-US" sz="2000" b="1">
                 <a:latin typeface="+mn-ea"/>
               </a:rPr>
-              <a:t>학습 방법</a:t>
-            </a:r>
-            <a:endParaRPr lang="en-US" altLang="ko-KR" sz="2000" b="1">
+              <a:t>딥러닝 학습 환경</a:t>
+            </a:r>
+            <a:endParaRPr lang="en-US" altLang="ko-KR" sz="2000" b="1" dirty="0">
               <a:latin typeface="+mn-ea"/>
             </a:endParaRPr>
           </a:p>
           <a:p>
-            <a:pPr marL="285750" indent="-285750">
+            <a:pPr>
               <a:lnSpc>
                 <a:spcPts val="2300"/>
               </a:lnSpc>
-              <a:buFontTx/>
-              <a:buChar char="-"/>
             </a:pPr>
             <a:r>
+              <a:rPr lang="en-US" altLang="ko-KR" sz="1600" dirty="0">
+                <a:solidFill>
+                  <a:srgbClr val="FF0000"/>
+                </a:solidFill>
+                <a:latin typeface="+mn-ea"/>
+              </a:rPr>
+              <a:t>  </a:t>
+            </a:r>
+            <a:r>
+              <a:rPr lang="en-US" altLang="ko-KR" sz="1600">
+                <a:solidFill>
+                  <a:srgbClr val="FF0000"/>
+                </a:solidFill>
+                <a:latin typeface="+mn-ea"/>
+              </a:rPr>
+              <a:t>- (CoLab) PC </a:t>
+            </a:r>
+            <a:r>
               <a:rPr lang="ko-KR" altLang="en-US" sz="1600">
+                <a:solidFill>
+                  <a:srgbClr val="FF0000"/>
+                </a:solidFill>
                 <a:latin typeface="+mn-ea"/>
               </a:rPr>
-              <a:t>모델 선정</a:t>
-            </a:r>
-            <a:endParaRPr lang="en-US" altLang="ko-KR" sz="1600">
+              <a:t>사양</a:t>
+            </a:r>
+            <a:r>
+              <a:rPr lang="en-US" altLang="ko-KR" sz="1600">
+                <a:solidFill>
+                  <a:srgbClr val="FF0000"/>
+                </a:solidFill>
+                <a:latin typeface="+mn-ea"/>
+              </a:rPr>
+              <a:t>, </a:t>
+            </a:r>
+            <a:r>
+              <a:rPr lang="ko-KR" altLang="en-US" sz="1600">
+                <a:solidFill>
+                  <a:srgbClr val="FF0000"/>
+                </a:solidFill>
+                <a:latin typeface="+mn-ea"/>
+              </a:rPr>
+              <a:t>학습시간</a:t>
+            </a:r>
+            <a:br>
+              <a:rPr lang="en-US" altLang="ko-KR" sz="1600">
+                <a:solidFill>
+                  <a:srgbClr val="FF0000"/>
+                </a:solidFill>
+                <a:latin typeface="+mn-ea"/>
+              </a:rPr>
+            </a:br>
+            <a:r>
+              <a:rPr lang="en-US" altLang="ko-KR" sz="1600">
+                <a:solidFill>
+                  <a:srgbClr val="FF0000"/>
+                </a:solidFill>
+                <a:latin typeface="+mn-ea"/>
+              </a:rPr>
+              <a:t> 	</a:t>
+            </a:r>
+            <a:r>
+              <a:rPr lang="en-US" altLang="ko-KR" sz="1600" kern="0" spc="-50">
+                <a:solidFill>
+                  <a:srgbClr val="FF0000"/>
+                </a:solidFill>
+                <a:latin typeface="맑은 고딕" panose="020B0503020000020004" pitchFamily="50" charset="-127"/>
+                <a:ea typeface="맑은 고딕" panose="020B0503020000020004" pitchFamily="50" charset="-127"/>
+              </a:rPr>
+              <a:t>CPU : </a:t>
+            </a:r>
+            <a:r>
+              <a:rPr lang="pt-BR" altLang="ko-KR" sz="1600" kern="0" spc="-50">
+                <a:solidFill>
+                  <a:srgbClr val="FF0000"/>
+                </a:solidFill>
+                <a:latin typeface="맑은 고딕" panose="020B0503020000020004" pitchFamily="50" charset="-127"/>
+                <a:ea typeface="맑은 고딕" panose="020B0503020000020004" pitchFamily="50" charset="-127"/>
+              </a:rPr>
+              <a:t>Intel Xeon CPU E5-2696 v5 @ 4.40GHz</a:t>
+            </a:r>
+            <a:br>
+              <a:rPr lang="pt-BR" altLang="ko-KR" sz="1600" kern="0" spc="-50">
+                <a:solidFill>
+                  <a:srgbClr val="FF0000"/>
+                </a:solidFill>
+                <a:latin typeface="맑은 고딕" panose="020B0503020000020004" pitchFamily="50" charset="-127"/>
+                <a:ea typeface="맑은 고딕" panose="020B0503020000020004" pitchFamily="50" charset="-127"/>
+              </a:rPr>
+            </a:br>
+            <a:r>
+              <a:rPr lang="pt-BR" altLang="ko-KR" sz="1600" kern="0" spc="-50">
+                <a:solidFill>
+                  <a:srgbClr val="FF0000"/>
+                </a:solidFill>
+                <a:latin typeface="맑은 고딕" panose="020B0503020000020004" pitchFamily="50" charset="-127"/>
+                <a:ea typeface="맑은 고딕" panose="020B0503020000020004" pitchFamily="50" charset="-127"/>
+              </a:rPr>
+              <a:t>	RAM : 512GB</a:t>
+            </a:r>
+            <a:br>
+              <a:rPr lang="pt-BR" altLang="ko-KR" sz="1600" kern="0" spc="-50">
+                <a:solidFill>
+                  <a:srgbClr val="FF0000"/>
+                </a:solidFill>
+                <a:latin typeface="맑은 고딕" panose="020B0503020000020004" pitchFamily="50" charset="-127"/>
+                <a:ea typeface="맑은 고딕" panose="020B0503020000020004" pitchFamily="50" charset="-127"/>
+              </a:rPr>
+            </a:br>
+            <a:r>
+              <a:rPr lang="pt-BR" altLang="ko-KR" sz="1600" kern="0" spc="-50">
+                <a:solidFill>
+                  <a:srgbClr val="FF0000"/>
+                </a:solidFill>
+                <a:latin typeface="맑은 고딕" panose="020B0503020000020004" pitchFamily="50" charset="-127"/>
+                <a:ea typeface="맑은 고딕" panose="020B0503020000020004" pitchFamily="50" charset="-127"/>
+              </a:rPr>
+              <a:t>	GPU : </a:t>
+            </a:r>
+            <a:r>
+              <a:rPr lang="en-US" altLang="ko-KR" sz="1600" kern="0" spc="-50">
+                <a:solidFill>
+                  <a:srgbClr val="FF0000"/>
+                </a:solidFill>
+                <a:latin typeface="맑은 고딕" panose="020B0503020000020004" pitchFamily="50" charset="-127"/>
+                <a:ea typeface="맑은 고딕" panose="020B0503020000020004" pitchFamily="50" charset="-127"/>
+              </a:rPr>
+              <a:t>NVIDIA GeForce GTX 1080 24GB</a:t>
+            </a:r>
+            <a:br>
+              <a:rPr lang="en-US" altLang="ko-KR" sz="1600">
+                <a:solidFill>
+                  <a:srgbClr val="FF0000"/>
+                </a:solidFill>
+                <a:latin typeface="+mn-ea"/>
+              </a:rPr>
+            </a:br>
+            <a:r>
+              <a:rPr lang="en-US" altLang="ko-KR" sz="1600">
+                <a:solidFill>
+                  <a:srgbClr val="FF0000"/>
+                </a:solidFill>
+                <a:latin typeface="+mn-ea"/>
+              </a:rPr>
+              <a:t>  - (SW) Pytorch, CUDA… </a:t>
+            </a:r>
+            <a:br>
+              <a:rPr lang="en-US" altLang="ko-KR" sz="1600">
+                <a:solidFill>
+                  <a:srgbClr val="FF0000"/>
+                </a:solidFill>
+                <a:latin typeface="+mn-ea"/>
+              </a:rPr>
+            </a:br>
+            <a:r>
+              <a:rPr lang="en-US" altLang="ko-KR" sz="1600">
+                <a:solidFill>
+                  <a:srgbClr val="FF0000"/>
+                </a:solidFill>
+                <a:latin typeface="+mn-ea"/>
+              </a:rPr>
+              <a:t>  - </a:t>
+            </a:r>
+            <a:r>
+              <a:rPr lang="ko-KR" altLang="en-US" sz="1600">
+                <a:solidFill>
+                  <a:srgbClr val="FF0000"/>
+                </a:solidFill>
+                <a:latin typeface="+mn-ea"/>
+              </a:rPr>
+              <a:t>하이퍼파라미터 </a:t>
+            </a:r>
+            <a:r>
+              <a:rPr lang="en-US" altLang="ko-KR" sz="1600">
+                <a:solidFill>
+                  <a:srgbClr val="FF0000"/>
+                </a:solidFill>
+                <a:latin typeface="+mn-ea"/>
+              </a:rPr>
+              <a:t>: epoch</a:t>
+            </a:r>
+            <a:r>
+              <a:rPr lang="ko-KR" altLang="en-US" sz="1600">
+                <a:solidFill>
+                  <a:srgbClr val="FF0000"/>
+                </a:solidFill>
+                <a:latin typeface="+mn-ea"/>
+              </a:rPr>
+              <a:t>수</a:t>
+            </a:r>
+            <a:r>
+              <a:rPr lang="en-US" altLang="ko-KR" sz="1600">
+                <a:solidFill>
+                  <a:srgbClr val="FF0000"/>
+                </a:solidFill>
+                <a:latin typeface="+mn-ea"/>
+              </a:rPr>
+              <a:t>, </a:t>
+            </a:r>
+            <a:r>
+              <a:rPr lang="ko-KR" altLang="en-US" sz="1600">
+                <a:solidFill>
+                  <a:srgbClr val="FF0000"/>
+                </a:solidFill>
+                <a:latin typeface="+mn-ea"/>
+              </a:rPr>
+              <a:t>학습률</a:t>
+            </a:r>
+            <a:r>
+              <a:rPr lang="en-US" altLang="ko-KR" sz="1600">
+                <a:solidFill>
+                  <a:srgbClr val="FF0000"/>
+                </a:solidFill>
+                <a:latin typeface="+mn-ea"/>
+              </a:rPr>
+              <a:t>, batch size, optimizer, loss </a:t>
+            </a:r>
+            <a:r>
+              <a:rPr lang="ko-KR" altLang="en-US" sz="1600">
+                <a:solidFill>
+                  <a:srgbClr val="FF0000"/>
+                </a:solidFill>
+                <a:latin typeface="+mn-ea"/>
+              </a:rPr>
+              <a:t>함수 등</a:t>
+            </a:r>
+            <a:br>
+              <a:rPr lang="en-US" altLang="ko-KR" sz="1600">
+                <a:solidFill>
+                  <a:srgbClr val="FF0000"/>
+                </a:solidFill>
+                <a:latin typeface="+mn-ea"/>
+              </a:rPr>
+            </a:br>
+            <a:r>
+              <a:rPr lang="en-US" altLang="ko-KR" sz="1600">
+                <a:solidFill>
+                  <a:srgbClr val="FF0000"/>
+                </a:solidFill>
+                <a:latin typeface="+mn-ea"/>
+              </a:rPr>
+              <a:t>  - </a:t>
+            </a:r>
+            <a:r>
+              <a:rPr lang="ko-KR" altLang="en-US" sz="1600">
+                <a:solidFill>
+                  <a:srgbClr val="FF0000"/>
+                </a:solidFill>
+                <a:latin typeface="+mn-ea"/>
+              </a:rPr>
+              <a:t>학습추이 그래프 등</a:t>
+            </a:r>
+            <a:endParaRPr lang="en-US" altLang="ko-KR" sz="1600" dirty="0">
+              <a:solidFill>
+                <a:srgbClr val="FF0000"/>
+              </a:solidFill>
               <a:latin typeface="+mn-ea"/>
             </a:endParaRPr>
           </a:p>
           <a:p>
-            <a:pPr marL="285750" indent="-285750">
+            <a:pPr>
               <a:lnSpc>
                 <a:spcPts val="2300"/>
               </a:lnSpc>
-              <a:buFontTx/>
-              <a:buChar char="-"/>
             </a:pPr>
             <a:r>
+              <a:rPr lang="en-US" altLang="ko-KR" sz="1600" dirty="0">
+                <a:solidFill>
+                  <a:srgbClr val="FF0000"/>
+                </a:solidFill>
+                <a:latin typeface="+mn-ea"/>
+              </a:rPr>
+              <a:t>  </a:t>
+            </a:r>
+            <a:r>
               <a:rPr lang="en-US" altLang="ko-KR" sz="1600">
+                <a:solidFill>
+                  <a:srgbClr val="FF0000"/>
+                </a:solidFill>
                 <a:latin typeface="+mn-ea"/>
               </a:rPr>
-              <a:t>Epochs, batch size </a:t>
+              <a:t>- </a:t>
             </a:r>
             <a:r>
               <a:rPr lang="ko-KR" altLang="en-US" sz="1600">
+                <a:solidFill>
+                  <a:srgbClr val="FF0000"/>
+                </a:solidFill>
                 <a:latin typeface="+mn-ea"/>
               </a:rPr>
-              <a:t>등</a:t>
+              <a:t>학습 중 알게 된 내용 등 </a:t>
             </a:r>
             <a:r>
               <a:rPr lang="en-US" altLang="ko-KR" sz="1600">
+                <a:solidFill>
+                  <a:srgbClr val="FF0000"/>
+                </a:solidFill>
                 <a:latin typeface="+mn-ea"/>
               </a:rPr>
+              <a:t>… </a:t>
+            </a:r>
+            <a:r>
+              <a:rPr lang="ko-KR" altLang="en-US" sz="1600">
+                <a:solidFill>
+                  <a:srgbClr val="FF0000"/>
+                </a:solidFill>
+                <a:latin typeface="+mn-ea"/>
+              </a:rPr>
+              <a:t>학습률</a:t>
+            </a:r>
+            <a:r>
+              <a:rPr lang="en-US" altLang="ko-KR" sz="1600">
+                <a:solidFill>
+                  <a:srgbClr val="FF0000"/>
+                </a:solidFill>
+                <a:latin typeface="+mn-ea"/>
+              </a:rPr>
+              <a:t>/optimzer</a:t>
+            </a:r>
+            <a:r>
+              <a:rPr lang="ko-KR" altLang="en-US" sz="1600">
+                <a:solidFill>
+                  <a:srgbClr val="FF0000"/>
+                </a:solidFill>
+                <a:latin typeface="+mn-ea"/>
+              </a:rPr>
+              <a:t>에 따른 학습추이 비교 등</a:t>
+            </a:r>
+            <a:r>
+              <a:rPr lang="en-US" altLang="ko-KR" sz="1600">
+                <a:solidFill>
+                  <a:srgbClr val="FF0000"/>
+                </a:solidFill>
+                <a:latin typeface="+mn-ea"/>
+              </a:rPr>
               <a:t>…</a:t>
             </a:r>
-          </a:p>
-          <a:p>
-            <a:pPr marL="285750" indent="-285750">
+            <a:endParaRPr lang="en-US" altLang="ko-KR" sz="1600" dirty="0">
+              <a:solidFill>
+                <a:srgbClr val="FF0000"/>
+              </a:solidFill>
+              <a:latin typeface="+mn-ea"/>
+            </a:endParaRPr>
+          </a:p>
+          <a:p>
+            <a:pPr>
               <a:lnSpc>
                 <a:spcPts val="2300"/>
               </a:lnSpc>
-              <a:buFontTx/>
-              <a:buChar char="-"/>
             </a:pPr>
-            <a:r>
-              <a:rPr lang="ko-KR" altLang="en-US" sz="1600">
-                <a:latin typeface="+mn-ea"/>
-              </a:rPr>
-              <a:t>학습 명령어</a:t>
-            </a:r>
-            <a:endParaRPr lang="en-US" altLang="ko-KR" sz="1600">
+            <a:endParaRPr lang="en-US" altLang="ko-KR" sz="1600" dirty="0">
               <a:latin typeface="+mn-ea"/>
             </a:endParaRPr>
           </a:p>
         </p:txBody>
       </p:sp>
+      <p:pic>
+        <p:nvPicPr>
+          <p:cNvPr id="10" name="_x849392696">
+            <a:extLst>
+              <a:ext uri="{FF2B5EF4-FFF2-40B4-BE49-F238E27FC236}">
+                <a16:creationId xmlns:a16="http://schemas.microsoft.com/office/drawing/2014/main" id="{09724804-D02A-417D-BB69-8D0E466DB527}"/>
+              </a:ext>
+            </a:extLst>
+          </p:cNvPr>
+          <p:cNvPicPr>
+            <a:picLocks noChangeAspect="1" noChangeArrowheads="1"/>
+          </p:cNvPicPr>
+          <p:nvPr/>
+        </p:nvPicPr>
+        <p:blipFill rotWithShape="1">
+          <a:blip r:embed="rId3">
+            <a:extLst>
+              <a:ext uri="{28A0092B-C50C-407E-A947-70E740481C1C}">
+                <a14:useLocalDpi xmlns:a14="http://schemas.microsoft.com/office/drawing/2010/main" val="0"/>
+              </a:ext>
+            </a:extLst>
+          </a:blip>
+          <a:srcRect l="7609" r="50313" b="58843"/>
+          <a:stretch/>
+        </p:blipFill>
+        <p:spPr bwMode="auto">
+          <a:xfrm>
+            <a:off x="683568" y="4038718"/>
+            <a:ext cx="3312368" cy="2057635"/>
+          </a:xfrm>
+          <a:prstGeom prst="rect">
+            <a:avLst/>
+          </a:prstGeom>
+          <a:noFill/>
+          <a:extLst>
+            <a:ext uri="{909E8E84-426E-40DD-AFC4-6F175D3DCCD1}">
+              <a14:hiddenFill xmlns:a14="http://schemas.microsoft.com/office/drawing/2010/main">
+                <a:solidFill>
+                  <a:srgbClr val="FFFFFF"/>
+                </a:solidFill>
+              </a14:hiddenFill>
+            </a:ext>
+          </a:extLst>
+        </p:spPr>
+      </p:pic>
+      <p:pic>
+        <p:nvPicPr>
+          <p:cNvPr id="11" name="_x849392696">
+            <a:extLst>
+              <a:ext uri="{FF2B5EF4-FFF2-40B4-BE49-F238E27FC236}">
+                <a16:creationId xmlns:a16="http://schemas.microsoft.com/office/drawing/2014/main" id="{65CD0D45-6955-4645-9D14-7B825BEC6813}"/>
+              </a:ext>
+            </a:extLst>
+          </p:cNvPr>
+          <p:cNvPicPr>
+            <a:picLocks noChangeAspect="1" noChangeArrowheads="1"/>
+          </p:cNvPicPr>
+          <p:nvPr/>
+        </p:nvPicPr>
+        <p:blipFill rotWithShape="1">
+          <a:blip r:embed="rId3">
+            <a:extLst>
+              <a:ext uri="{28A0092B-C50C-407E-A947-70E740481C1C}">
+                <a14:useLocalDpi xmlns:a14="http://schemas.microsoft.com/office/drawing/2010/main" val="0"/>
+              </a:ext>
+            </a:extLst>
+          </a:blip>
+          <a:srcRect l="7609" t="46090" r="50313" b="7342"/>
+          <a:stretch/>
+        </p:blipFill>
+        <p:spPr bwMode="auto">
+          <a:xfrm>
+            <a:off x="4644008" y="4005064"/>
+            <a:ext cx="3312368" cy="2328193"/>
+          </a:xfrm>
+          <a:prstGeom prst="rect">
+            <a:avLst/>
+          </a:prstGeom>
+          <a:noFill/>
+          <a:extLst>
+            <a:ext uri="{909E8E84-426E-40DD-AFC4-6F175D3DCCD1}">
+              <a14:hiddenFill xmlns:a14="http://schemas.microsoft.com/office/drawing/2010/main">
+                <a:solidFill>
+                  <a:srgbClr val="FFFFFF"/>
+                </a:solidFill>
+              </a14:hiddenFill>
+            </a:ext>
+          </a:extLst>
+        </p:spPr>
+      </p:pic>
     </p:spTree>
     <p:extLst>
       <p:ext uri="{BB962C8B-B14F-4D97-AF65-F5344CB8AC3E}">
-        <p14:creationId xmlns:p14="http://schemas.microsoft.com/office/powerpoint/2010/main" val="1764871925"/>
+        <p14:creationId xmlns:p14="http://schemas.microsoft.com/office/powerpoint/2010/main" val="2451453977"/>
       </p:ext>
     </p:extLst>
   </p:cSld>
@@ -12844,7 +14549,7 @@
         </p:nvSpPr>
         <p:spPr>
           <a:xfrm>
-            <a:off x="176544" y="85377"/>
+            <a:off x="299927" y="105444"/>
             <a:ext cx="8196507" cy="584775"/>
           </a:xfrm>
           <a:prstGeom prst="rect">
@@ -12866,7 +14571,7 @@
                 <a:latin typeface="HY견고딕" panose="02030600000101010101" pitchFamily="18" charset="-127"/>
                 <a:ea typeface="HY견고딕" panose="02030600000101010101" pitchFamily="18" charset="-127"/>
               </a:rPr>
-              <a:t>모델 학습 </a:t>
+              <a:t>모델 학습</a:t>
             </a:r>
             <a:endParaRPr lang="ko-KR" altLang="en-US" sz="3200" dirty="0">
               <a:solidFill>
@@ -12893,7 +14598,7 @@
         <p:spPr>
           <a:xfrm>
             <a:off x="155912" y="944638"/>
-            <a:ext cx="8706254" cy="948145"/>
+            <a:ext cx="8706254" cy="2127955"/>
           </a:xfrm>
           <a:prstGeom prst="rect">
             <a:avLst/>
@@ -12915,105 +14620,111 @@
               <a:rPr lang="ko-KR" altLang="en-US" sz="2000" b="1">
                 <a:latin typeface="+mn-ea"/>
               </a:rPr>
-              <a:t>학습 출력 결과</a:t>
-            </a:r>
-            <a:endParaRPr lang="en-US" altLang="ko-KR" sz="2000" b="1">
+              <a:t>딥러닝 학습 환경</a:t>
+            </a:r>
+            <a:endParaRPr lang="en-US" altLang="ko-KR" sz="2000" b="1" dirty="0">
               <a:latin typeface="+mn-ea"/>
             </a:endParaRPr>
           </a:p>
           <a:p>
-            <a:pPr marL="285750" indent="-285750">
+            <a:pPr>
               <a:lnSpc>
                 <a:spcPts val="2300"/>
               </a:lnSpc>
-              <a:buFontTx/>
-              <a:buChar char="-"/>
             </a:pPr>
+            <a:r>
+              <a:rPr lang="en-US" altLang="ko-KR" sz="1600" dirty="0">
+                <a:latin typeface="+mn-ea"/>
+              </a:rPr>
+              <a:t>  </a:t>
+            </a:r>
+            <a:r>
+              <a:rPr lang="en-US" altLang="ko-KR" sz="1600">
+                <a:latin typeface="+mn-ea"/>
+              </a:rPr>
+              <a:t>- (HW)  </a:t>
+            </a:r>
+            <a:r>
+              <a:rPr lang="en-US" altLang="ko-KR" sz="1600" kern="0" spc="-50">
+                <a:latin typeface="맑은 고딕" panose="020B0503020000020004" pitchFamily="50" charset="-127"/>
+                <a:ea typeface="맑은 고딕" panose="020B0503020000020004" pitchFamily="50" charset="-127"/>
+              </a:rPr>
+              <a:t>CPU :</a:t>
+            </a:r>
+            <a:br>
+              <a:rPr lang="pt-BR" altLang="ko-KR" sz="1600" kern="0" spc="-50">
+                <a:latin typeface="맑은 고딕" panose="020B0503020000020004" pitchFamily="50" charset="-127"/>
+                <a:ea typeface="맑은 고딕" panose="020B0503020000020004" pitchFamily="50" charset="-127"/>
+              </a:rPr>
+            </a:br>
+            <a:r>
+              <a:rPr lang="pt-BR" altLang="ko-KR" sz="1600" kern="0" spc="-50">
+                <a:latin typeface="맑은 고딕" panose="020B0503020000020004" pitchFamily="50" charset="-127"/>
+                <a:ea typeface="맑은 고딕" panose="020B0503020000020004" pitchFamily="50" charset="-127"/>
+              </a:rPr>
+              <a:t>	RAM :</a:t>
+            </a:r>
+            <a:br>
+              <a:rPr lang="pt-BR" altLang="ko-KR" sz="1600" kern="0" spc="-50">
+                <a:latin typeface="맑은 고딕" panose="020B0503020000020004" pitchFamily="50" charset="-127"/>
+                <a:ea typeface="맑은 고딕" panose="020B0503020000020004" pitchFamily="50" charset="-127"/>
+              </a:rPr>
+            </a:br>
+            <a:r>
+              <a:rPr lang="pt-BR" altLang="ko-KR" sz="1600" kern="0" spc="-50">
+                <a:latin typeface="맑은 고딕" panose="020B0503020000020004" pitchFamily="50" charset="-127"/>
+                <a:ea typeface="맑은 고딕" panose="020B0503020000020004" pitchFamily="50" charset="-127"/>
+              </a:rPr>
+              <a:t>	GPU :</a:t>
+            </a:r>
+            <a:br>
+              <a:rPr lang="en-US" altLang="ko-KR" sz="1600">
+                <a:latin typeface="+mn-ea"/>
+              </a:rPr>
+            </a:br>
+            <a:r>
+              <a:rPr lang="en-US" altLang="ko-KR" sz="1600">
+                <a:latin typeface="+mn-ea"/>
+              </a:rPr>
+              <a:t>  - (SW) Pytorch : 1.11.0 CUDA toolkit : 11.3.1 </a:t>
+            </a:r>
+            <a:br>
+              <a:rPr lang="en-US" altLang="ko-KR" sz="1600">
+                <a:latin typeface="+mn-ea"/>
+              </a:rPr>
+            </a:br>
+            <a:r>
+              <a:rPr lang="en-US" altLang="ko-KR" sz="1600">
+                <a:latin typeface="+mn-ea"/>
+              </a:rPr>
+              <a:t>  - </a:t>
+            </a:r>
             <a:r>
               <a:rPr lang="ko-KR" altLang="en-US" sz="1600">
                 <a:latin typeface="+mn-ea"/>
               </a:rPr>
-              <a:t>재현율</a:t>
-            </a:r>
-            <a:r>
-              <a:rPr lang="en-US" altLang="ko-KR" sz="1600">
-                <a:latin typeface="+mn-ea"/>
-              </a:rPr>
-              <a:t>, </a:t>
-            </a:r>
-            <a:r>
-              <a:rPr lang="ko-KR" altLang="en-US" sz="1600">
-                <a:latin typeface="+mn-ea"/>
-              </a:rPr>
-              <a:t>정밀도</a:t>
-            </a:r>
-            <a:r>
-              <a:rPr lang="en-US" altLang="ko-KR" sz="1600">
-                <a:latin typeface="+mn-ea"/>
-              </a:rPr>
-              <a:t>, mAP</a:t>
-            </a:r>
-          </a:p>
-          <a:p>
-            <a:pPr marL="285750" indent="-285750">
+              <a:t>학습 중 추가 설정</a:t>
+            </a:r>
+            <a:endParaRPr lang="en-US" altLang="ko-KR" sz="1600" dirty="0">
+              <a:latin typeface="+mn-ea"/>
+            </a:endParaRPr>
+          </a:p>
+          <a:p>
+            <a:pPr>
               <a:lnSpc>
                 <a:spcPts val="2300"/>
               </a:lnSpc>
-              <a:buFontTx/>
-              <a:buChar char="-"/>
             </a:pPr>
-            <a:r>
-              <a:rPr lang="ko-KR" altLang="en-US" sz="1600">
-                <a:latin typeface="+mn-ea"/>
-              </a:rPr>
-              <a:t>학습 시간 등</a:t>
-            </a:r>
-            <a:r>
-              <a:rPr lang="en-US" altLang="ko-KR" sz="1600">
-                <a:latin typeface="+mn-ea"/>
-              </a:rPr>
-              <a:t>…</a:t>
-            </a:r>
             <a:endParaRPr lang="en-US" altLang="ko-KR" sz="1600" dirty="0">
               <a:latin typeface="+mn-ea"/>
             </a:endParaRPr>
           </a:p>
         </p:txBody>
       </p:sp>
-      <p:pic>
-        <p:nvPicPr>
-          <p:cNvPr id="3" name="그림 2">
-            <a:extLst>
-              <a:ext uri="{FF2B5EF4-FFF2-40B4-BE49-F238E27FC236}">
-                <a16:creationId xmlns:a16="http://schemas.microsoft.com/office/drawing/2014/main" id="{D62B0F9C-F1AD-DDBC-6380-9E4FF8485A2A}"/>
-              </a:ext>
-            </a:extLst>
-          </p:cNvPr>
-          <p:cNvPicPr>
-            <a:picLocks noChangeAspect="1"/>
-          </p:cNvPicPr>
-          <p:nvPr/>
-        </p:nvPicPr>
-        <p:blipFill>
-          <a:blip r:embed="rId3"/>
-          <a:stretch>
-            <a:fillRect/>
-          </a:stretch>
-        </p:blipFill>
-        <p:spPr>
-          <a:xfrm>
-            <a:off x="327276" y="3782342"/>
-            <a:ext cx="8529154" cy="2686747"/>
-          </a:xfrm>
-          <a:prstGeom prst="rect">
-            <a:avLst/>
-          </a:prstGeom>
-        </p:spPr>
-      </p:pic>
     </p:spTree>
     <p:extLst>
       <p:ext uri="{BB962C8B-B14F-4D97-AF65-F5344CB8AC3E}">
-        <p14:creationId xmlns:p14="http://schemas.microsoft.com/office/powerpoint/2010/main" val="4286634692"/>
+        <p14:creationId xmlns:p14="http://schemas.microsoft.com/office/powerpoint/2010/main" val="949481758"/>
       </p:ext>
     </p:extLst>
   </p:cSld>
@@ -13286,7 +14997,7 @@
         </p:nvSpPr>
         <p:spPr>
           <a:xfrm>
-            <a:off x="299927" y="105444"/>
+            <a:off x="176544" y="85377"/>
             <a:ext cx="8196507" cy="584775"/>
           </a:xfrm>
           <a:prstGeom prst="rect">
@@ -13308,7 +15019,7 @@
                 <a:latin typeface="HY견고딕" panose="02030600000101010101" pitchFamily="18" charset="-127"/>
                 <a:ea typeface="HY견고딕" panose="02030600000101010101" pitchFamily="18" charset="-127"/>
               </a:rPr>
-              <a:t>결과 및 토의</a:t>
+              <a:t>모델 학습 </a:t>
             </a:r>
             <a:endParaRPr lang="ko-KR" altLang="en-US" sz="3200" dirty="0">
               <a:solidFill>
@@ -13335,7 +15046,7 @@
         <p:spPr>
           <a:xfrm>
             <a:off x="155912" y="944638"/>
-            <a:ext cx="8706254" cy="948145"/>
+            <a:ext cx="8706254" cy="1243097"/>
           </a:xfrm>
           <a:prstGeom prst="rect">
             <a:avLst/>
@@ -13357,262 +15068,81 @@
               <a:rPr lang="ko-KR" altLang="en-US" sz="2000" b="1">
                 <a:latin typeface="+mn-ea"/>
               </a:rPr>
-              <a:t>검증 결과</a:t>
-            </a:r>
-            <a:br>
-              <a:rPr lang="en-US" altLang="ko-KR" sz="2000" b="1">
+              <a:t>학습 방법</a:t>
+            </a:r>
+            <a:endParaRPr lang="en-US" altLang="ko-KR" sz="2000" b="1">
+              <a:latin typeface="+mn-ea"/>
+            </a:endParaRPr>
+          </a:p>
+          <a:p>
+            <a:pPr marL="285750" indent="-285750">
+              <a:lnSpc>
+                <a:spcPts val="2300"/>
+              </a:lnSpc>
+              <a:buFontTx/>
+              <a:buChar char="-"/>
+            </a:pPr>
+            <a:r>
+              <a:rPr lang="ko-KR" altLang="en-US" sz="1600">
                 <a:latin typeface="+mn-ea"/>
               </a:rPr>
-            </a:br>
+              <a:t>모델 선정</a:t>
+            </a:r>
+            <a:endParaRPr lang="en-US" altLang="ko-KR" sz="1600">
+              <a:latin typeface="+mn-ea"/>
+            </a:endParaRPr>
+          </a:p>
+          <a:p>
+            <a:pPr marL="285750" indent="-285750">
+              <a:lnSpc>
+                <a:spcPts val="2300"/>
+              </a:lnSpc>
+              <a:buFontTx/>
+              <a:buChar char="-"/>
+            </a:pPr>
             <a:r>
               <a:rPr lang="en-US" altLang="ko-KR" sz="1600">
                 <a:latin typeface="+mn-ea"/>
               </a:rPr>
-              <a:t>  - Confusion matrix </a:t>
+              <a:t>Epochs, batch size </a:t>
             </a:r>
             <a:r>
               <a:rPr lang="ko-KR" altLang="en-US" sz="1600">
                 <a:latin typeface="+mn-ea"/>
               </a:rPr>
-              <a:t>및 평가지표</a:t>
-            </a:r>
-            <a:br>
-              <a:rPr lang="en-US" altLang="ko-KR" sz="1600" dirty="0">
-                <a:latin typeface="+mn-ea"/>
-              </a:rPr>
-            </a:br>
+              <a:t>등</a:t>
+            </a:r>
             <a:r>
               <a:rPr lang="en-US" altLang="ko-KR" sz="1600">
                 <a:latin typeface="+mn-ea"/>
               </a:rPr>
-              <a:t>  - train:val = 8:2 … </a:t>
-            </a:r>
-            <a:endParaRPr lang="en-US" altLang="ko-KR" sz="1600" dirty="0">
+              <a:t>… / hyperparameter, learning rate, …</a:t>
+            </a:r>
+          </a:p>
+          <a:p>
+            <a:pPr marL="285750" indent="-285750">
+              <a:lnSpc>
+                <a:spcPts val="2300"/>
+              </a:lnSpc>
+              <a:buFontTx/>
+              <a:buChar char="-"/>
+            </a:pPr>
+            <a:r>
+              <a:rPr lang="ko-KR" altLang="en-US" sz="1600">
+                <a:latin typeface="+mn-ea"/>
+              </a:rPr>
+              <a:t>학습 명령어</a:t>
+            </a:r>
+            <a:endParaRPr lang="en-US" altLang="ko-KR" sz="1600">
               <a:latin typeface="+mn-ea"/>
             </a:endParaRPr>
           </a:p>
         </p:txBody>
       </p:sp>
-      <p:sp>
-        <p:nvSpPr>
-          <p:cNvPr id="2" name="Rectangle 2">
-            <a:extLst>
-              <a:ext uri="{FF2B5EF4-FFF2-40B4-BE49-F238E27FC236}">
-                <a16:creationId xmlns:a16="http://schemas.microsoft.com/office/drawing/2014/main" id="{E057CE83-A631-4F97-B4D5-A931F02A9187}"/>
-              </a:ext>
-            </a:extLst>
-          </p:cNvPr>
-          <p:cNvSpPr>
-            <a:spLocks noChangeArrowheads="1"/>
-          </p:cNvSpPr>
-          <p:nvPr/>
-        </p:nvSpPr>
-        <p:spPr bwMode="auto">
-          <a:xfrm>
-            <a:off x="1801018" y="4113306"/>
-            <a:ext cx="9144000" cy="457200"/>
-          </a:xfrm>
-          <a:prstGeom prst="rect">
-            <a:avLst/>
-          </a:prstGeom>
-          <a:noFill/>
-          <a:ln>
-            <a:noFill/>
-          </a:ln>
-          <a:effectLst/>
-          <a:extLst>
-            <a:ext uri="{909E8E84-426E-40DD-AFC4-6F175D3DCCD1}">
-              <a14:hiddenFill xmlns:a14="http://schemas.microsoft.com/office/drawing/2010/main">
-                <a:solidFill>
-                  <a:schemeClr val="accent1"/>
-                </a:solidFill>
-              </a14:hiddenFill>
-            </a:ext>
-            <a:ext uri="{91240B29-F687-4F45-9708-019B960494DF}">
-              <a14:hiddenLine xmlns:a14="http://schemas.microsoft.com/office/drawing/2010/main" w="9525">
-                <a:solidFill>
-                  <a:schemeClr val="tx1"/>
-                </a:solidFill>
-                <a:miter lim="800000"/>
-                <a:headEnd/>
-                <a:tailEnd/>
-              </a14:hiddenLine>
-            </a:ext>
-            <a:ext uri="{AF507438-7753-43E0-B8FC-AC1667EBCBE1}">
-              <a14:hiddenEffects xmlns:a14="http://schemas.microsoft.com/office/drawing/2010/main">
-                <a:effectLst>
-                  <a:outerShdw dist="35921" dir="2700000" algn="ctr" rotWithShape="0">
-                    <a:schemeClr val="bg2"/>
-                  </a:outerShdw>
-                </a:effectLst>
-              </a14:hiddenEffects>
-            </a:ext>
-          </a:extLst>
-        </p:spPr>
-        <p:txBody>
-          <a:bodyPr vert="horz" wrap="none" lIns="91440" tIns="45720" rIns="91440" bIns="45720" numCol="1" anchor="ctr" anchorCtr="0" compatLnSpc="1">
-            <a:prstTxWarp prst="textNoShape">
-              <a:avLst/>
-            </a:prstTxWarp>
-            <a:spAutoFit/>
-          </a:bodyPr>
-          <a:lstStyle/>
-          <a:p>
-            <a:endParaRPr lang="ko-KR" altLang="en-US"/>
-          </a:p>
-        </p:txBody>
-      </p:sp>
-      <p:pic>
-        <p:nvPicPr>
-          <p:cNvPr id="13" name="그림 12">
-            <a:extLst>
-              <a:ext uri="{FF2B5EF4-FFF2-40B4-BE49-F238E27FC236}">
-                <a16:creationId xmlns:a16="http://schemas.microsoft.com/office/drawing/2014/main" id="{CED5E422-547F-1CFD-5790-D35EA784472C}"/>
-              </a:ext>
-            </a:extLst>
-          </p:cNvPr>
-          <p:cNvPicPr>
-            <a:picLocks noChangeAspect="1"/>
-          </p:cNvPicPr>
-          <p:nvPr/>
-        </p:nvPicPr>
-        <p:blipFill rotWithShape="1">
-          <a:blip r:embed="rId3"/>
-          <a:srcRect r="35593"/>
-          <a:stretch/>
-        </p:blipFill>
-        <p:spPr>
-          <a:xfrm>
-            <a:off x="1229907" y="1918780"/>
-            <a:ext cx="6684186" cy="1679122"/>
-          </a:xfrm>
-          <a:prstGeom prst="rect">
-            <a:avLst/>
-          </a:prstGeom>
-        </p:spPr>
-      </p:pic>
-      <p:pic>
-        <p:nvPicPr>
-          <p:cNvPr id="19" name="그림 18">
-            <a:extLst>
-              <a:ext uri="{FF2B5EF4-FFF2-40B4-BE49-F238E27FC236}">
-                <a16:creationId xmlns:a16="http://schemas.microsoft.com/office/drawing/2014/main" id="{3D451981-BE28-BC4D-481B-FEF087F2504B}"/>
-              </a:ext>
-            </a:extLst>
-          </p:cNvPr>
-          <p:cNvPicPr>
-            <a:picLocks noChangeAspect="1"/>
-          </p:cNvPicPr>
-          <p:nvPr/>
-        </p:nvPicPr>
-        <p:blipFill rotWithShape="1">
-          <a:blip r:embed="rId4"/>
-          <a:srcRect r="32005"/>
-          <a:stretch/>
-        </p:blipFill>
-        <p:spPr>
-          <a:xfrm>
-            <a:off x="899592" y="3856355"/>
-            <a:ext cx="3240359" cy="2688163"/>
-          </a:xfrm>
-          <a:prstGeom prst="rect">
-            <a:avLst/>
-          </a:prstGeom>
-        </p:spPr>
-      </p:pic>
-      <p:pic>
-        <p:nvPicPr>
-          <p:cNvPr id="20" name="그림 19">
-            <a:extLst>
-              <a:ext uri="{FF2B5EF4-FFF2-40B4-BE49-F238E27FC236}">
-                <a16:creationId xmlns:a16="http://schemas.microsoft.com/office/drawing/2014/main" id="{F478B0CA-6918-2B0F-47A0-65C455119CAB}"/>
-              </a:ext>
-            </a:extLst>
-          </p:cNvPr>
-          <p:cNvPicPr>
-            <a:picLocks noChangeAspect="1"/>
-          </p:cNvPicPr>
-          <p:nvPr/>
-        </p:nvPicPr>
-        <p:blipFill>
-          <a:blip r:embed="rId5"/>
-          <a:stretch>
-            <a:fillRect/>
-          </a:stretch>
-        </p:blipFill>
-        <p:spPr>
-          <a:xfrm>
-            <a:off x="5216089" y="3650195"/>
-            <a:ext cx="3028319" cy="2894323"/>
-          </a:xfrm>
-          <a:prstGeom prst="rect">
-            <a:avLst/>
-          </a:prstGeom>
-        </p:spPr>
-      </p:pic>
-      <p:pic>
-        <p:nvPicPr>
-          <p:cNvPr id="21" name="그림 20">
-            <a:extLst>
-              <a:ext uri="{FF2B5EF4-FFF2-40B4-BE49-F238E27FC236}">
-                <a16:creationId xmlns:a16="http://schemas.microsoft.com/office/drawing/2014/main" id="{29AA96CC-8BB6-0B42-21D4-6E2301BEA0AF}"/>
-              </a:ext>
-            </a:extLst>
-          </p:cNvPr>
-          <p:cNvPicPr>
-            <a:picLocks noChangeAspect="1"/>
-          </p:cNvPicPr>
-          <p:nvPr/>
-        </p:nvPicPr>
-        <p:blipFill>
-          <a:blip r:embed="rId6"/>
-          <a:stretch>
-            <a:fillRect/>
-          </a:stretch>
-        </p:blipFill>
-        <p:spPr>
-          <a:xfrm>
-            <a:off x="5796136" y="5262697"/>
-            <a:ext cx="1883627" cy="632313"/>
-          </a:xfrm>
-          <a:prstGeom prst="rect">
-            <a:avLst/>
-          </a:prstGeom>
-        </p:spPr>
-      </p:pic>
-      <p:pic>
-        <p:nvPicPr>
-          <p:cNvPr id="22" name="그림 21">
-            <a:extLst>
-              <a:ext uri="{FF2B5EF4-FFF2-40B4-BE49-F238E27FC236}">
-                <a16:creationId xmlns:a16="http://schemas.microsoft.com/office/drawing/2014/main" id="{32D8B2C7-317B-2B1C-4A4E-CF7265435892}"/>
-              </a:ext>
-            </a:extLst>
-          </p:cNvPr>
-          <p:cNvPicPr>
-            <a:picLocks noChangeAspect="1"/>
-          </p:cNvPicPr>
-          <p:nvPr/>
-        </p:nvPicPr>
-        <p:blipFill rotWithShape="1">
-          <a:blip r:embed="rId4"/>
-          <a:srcRect l="66994" b="82094"/>
-          <a:stretch/>
-        </p:blipFill>
-        <p:spPr>
-          <a:xfrm>
-            <a:off x="1499021" y="5262697"/>
-            <a:ext cx="2032916" cy="717816"/>
-          </a:xfrm>
-          <a:prstGeom prst="rect">
-            <a:avLst/>
-          </a:prstGeom>
-        </p:spPr>
-      </p:pic>
     </p:spTree>
     <p:extLst>
       <p:ext uri="{BB962C8B-B14F-4D97-AF65-F5344CB8AC3E}">
-        <p14:creationId xmlns:p14="http://schemas.microsoft.com/office/powerpoint/2010/main" val="3760288516"/>
+        <p14:creationId xmlns:p14="http://schemas.microsoft.com/office/powerpoint/2010/main" val="1764871925"/>
       </p:ext>
     </p:extLst>
   </p:cSld>
@@ -14662,18 +16192,18 @@
 </file>
 
 <file path=customXml/item2.xml><?xml version="1.0" encoding="utf-8"?>
-<p:properties xmlns:p="http://schemas.microsoft.com/office/2006/metadata/properties" xmlns:xsi="http://www.w3.org/2001/XMLSchema-instance" xmlns:pc="http://schemas.microsoft.com/office/infopath/2007/PartnerControls">
-  <documentManagement/>
-</p:properties>
-</file>
-
-<file path=customXml/item3.xml><?xml version="1.0" encoding="utf-8"?>
 <?mso-contentType ?>
 <FormTemplates xmlns="http://schemas.microsoft.com/sharepoint/v3/contenttype/forms">
   <Display>DocumentLibraryForm</Display>
   <Edit>DocumentLibraryForm</Edit>
   <New>DocumentLibraryForm</New>
 </FormTemplates>
+</file>
+
+<file path=customXml/item3.xml><?xml version="1.0" encoding="utf-8"?>
+<p:properties xmlns:p="http://schemas.microsoft.com/office/2006/metadata/properties" xmlns:xsi="http://www.w3.org/2001/XMLSchema-instance" xmlns:pc="http://schemas.microsoft.com/office/infopath/2007/PartnerControls">
+  <documentManagement/>
+</p:properties>
 </file>
 
 <file path=customXml/itemProps1.xml><?xml version="1.0" encoding="utf-8"?>
@@ -14695,6 +16225,14 @@
 </file>
 
 <file path=customXml/itemProps2.xml><?xml version="1.0" encoding="utf-8"?>
+<ds:datastoreItem xmlns:ds="http://schemas.openxmlformats.org/officeDocument/2006/customXml" ds:itemID="{6A025E80-6017-4340-852A-AD128310F2C0}">
+  <ds:schemaRefs>
+    <ds:schemaRef ds:uri="http://schemas.microsoft.com/sharepoint/v3/contenttype/forms"/>
+  </ds:schemaRefs>
+</ds:datastoreItem>
+</file>
+
+<file path=customXml/itemProps3.xml><?xml version="1.0" encoding="utf-8"?>
 <ds:datastoreItem xmlns:ds="http://schemas.openxmlformats.org/officeDocument/2006/customXml" ds:itemID="{37FA2EDF-CBB7-475B-B0D9-861160A98246}">
   <ds:schemaRefs>
     <ds:schemaRef ds:uri="http://purl.org/dc/elements/1.1/"/>
@@ -14708,12 +16246,4 @@
     <ds:schemaRef ds:uri="http://www.w3.org/XML/1998/namespace"/>
   </ds:schemaRefs>
 </ds:datastoreItem>
-</file>
-
-<file path=customXml/itemProps3.xml><?xml version="1.0" encoding="utf-8"?>
-<ds:datastoreItem xmlns:ds="http://schemas.openxmlformats.org/officeDocument/2006/customXml" ds:itemID="{6A025E80-6017-4340-852A-AD128310F2C0}">
-  <ds:schemaRefs>
-    <ds:schemaRef ds:uri="http://schemas.microsoft.com/sharepoint/v3/contenttype/forms"/>
-  </ds:schemaRefs>
-</ds:datastoreItem>
 </file>
</xml_diff>